<commit_message>
few changes in ppt
</commit_message>
<xml_diff>
--- a/Group 9 Poject Presentation.pptx
+++ b/Group 9 Poject Presentation.pptx
@@ -6,17 +6,17 @@
   </p:sldMasterIdLst>
   <p:sldIdLst>
     <p:sldId id="256" r:id="rId2"/>
-    <p:sldId id="257" r:id="rId3"/>
-    <p:sldId id="258" r:id="rId4"/>
-    <p:sldId id="260" r:id="rId5"/>
-    <p:sldId id="261" r:id="rId6"/>
-    <p:sldId id="270" r:id="rId7"/>
-    <p:sldId id="259" r:id="rId8"/>
-    <p:sldId id="262" r:id="rId9"/>
-    <p:sldId id="263" r:id="rId10"/>
-    <p:sldId id="264" r:id="rId11"/>
-    <p:sldId id="265" r:id="rId12"/>
-    <p:sldId id="271" r:id="rId13"/>
+    <p:sldId id="258" r:id="rId3"/>
+    <p:sldId id="261" r:id="rId4"/>
+    <p:sldId id="270" r:id="rId5"/>
+    <p:sldId id="259" r:id="rId6"/>
+    <p:sldId id="262" r:id="rId7"/>
+    <p:sldId id="263" r:id="rId8"/>
+    <p:sldId id="264" r:id="rId9"/>
+    <p:sldId id="265" r:id="rId10"/>
+    <p:sldId id="271" r:id="rId11"/>
+    <p:sldId id="272" r:id="rId12"/>
+    <p:sldId id="273" r:id="rId13"/>
     <p:sldId id="269" r:id="rId14"/>
     <p:sldId id="268" r:id="rId15"/>
   </p:sldIdLst>
@@ -117,6 +117,22 @@
       </a:defRPr>
     </a:lvl9pPr>
   </p:defaultTextStyle>
+  <p:extLst>
+    <p:ext uri="{EFAFB233-063F-42B5-8137-9DF3F51BA10A}">
+      <p15:sldGuideLst xmlns:p15="http://schemas.microsoft.com/office/powerpoint/2012/main">
+        <p15:guide id="1" orient="horz" pos="2160">
+          <p15:clr>
+            <a:srgbClr val="A4A3A4"/>
+          </p15:clr>
+        </p15:guide>
+        <p15:guide id="2" pos="2880">
+          <p15:clr>
+            <a:srgbClr val="A4A3A4"/>
+          </p15:clr>
+        </p15:guide>
+      </p15:sldGuideLst>
+    </p:ext>
+  </p:extLst>
 </p:presentation>
 </file>
 
@@ -235,10 +251,9 @@
           </a:lstStyle>
           <a:p>
             <a:r>
-              <a:rPr kumimoji="0" lang="en-US" smtClean="0"/>
+              <a:rPr kumimoji="0" lang="en-US"/>
               <a:t>Click to edit Master title style</a:t>
             </a:r>
-            <a:endParaRPr kumimoji="0" lang="en-US"/>
           </a:p>
         </p:txBody>
       </p:sp>
@@ -306,10 +321,9 @@
           </a:lstStyle>
           <a:p>
             <a:r>
-              <a:rPr kumimoji="0" lang="en-US" smtClean="0"/>
+              <a:rPr kumimoji="0" lang="en-US"/>
               <a:t>Click to edit Master subtitle style</a:t>
             </a:r>
-            <a:endParaRPr kumimoji="0" lang="en-US"/>
           </a:p>
         </p:txBody>
       </p:sp>
@@ -340,7 +354,7 @@
             <a:fld id="{36E064BB-D46D-4FB1-B399-7F9F6915DB6C}" type="datetimeFigureOut">
               <a:rPr lang="en-US" smtClean="0"/>
               <a:pPr/>
-              <a:t>12/5/2020</a:t>
+              <a:t>5/14/2021</a:t>
             </a:fld>
             <a:endParaRPr lang="en-US" dirty="0"/>
           </a:p>
@@ -452,10 +466,9 @@
           <a:lstStyle/>
           <a:p>
             <a:r>
-              <a:rPr kumimoji="0" lang="en-US" smtClean="0"/>
+              <a:rPr kumimoji="0" lang="en-US"/>
               <a:t>Click to edit Master title style</a:t>
             </a:r>
-            <a:endParaRPr kumimoji="0" lang="en-US"/>
           </a:p>
         </p:txBody>
       </p:sp>
@@ -476,35 +489,35 @@
           <a:p>
             <a:pPr lvl="0" eaLnBrk="1" latinLnBrk="0" hangingPunct="1"/>
             <a:r>
-              <a:rPr lang="en-US" smtClean="0"/>
+              <a:rPr lang="en-US"/>
               <a:t>Click to edit Master text styles</a:t>
             </a:r>
           </a:p>
           <a:p>
             <a:pPr lvl="1" eaLnBrk="1" latinLnBrk="0" hangingPunct="1"/>
             <a:r>
-              <a:rPr lang="en-US" smtClean="0"/>
+              <a:rPr lang="en-US"/>
               <a:t>Second level</a:t>
             </a:r>
           </a:p>
           <a:p>
             <a:pPr lvl="2" eaLnBrk="1" latinLnBrk="0" hangingPunct="1"/>
             <a:r>
-              <a:rPr lang="en-US" smtClean="0"/>
+              <a:rPr lang="en-US"/>
               <a:t>Third level</a:t>
             </a:r>
           </a:p>
           <a:p>
             <a:pPr lvl="3" eaLnBrk="1" latinLnBrk="0" hangingPunct="1"/>
             <a:r>
-              <a:rPr lang="en-US" smtClean="0"/>
+              <a:rPr lang="en-US"/>
               <a:t>Fourth level</a:t>
             </a:r>
           </a:p>
           <a:p>
             <a:pPr lvl="4" eaLnBrk="1" latinLnBrk="0" hangingPunct="1"/>
             <a:r>
-              <a:rPr lang="en-US" smtClean="0"/>
+              <a:rPr lang="en-US"/>
               <a:t>Fifth level</a:t>
             </a:r>
             <a:endParaRPr kumimoji="0" lang="en-US"/>
@@ -529,7 +542,7 @@
             <a:fld id="{36E064BB-D46D-4FB1-B399-7F9F6915DB6C}" type="datetimeFigureOut">
               <a:rPr lang="en-US" smtClean="0"/>
               <a:pPr/>
-              <a:t>12/5/2020</a:t>
+              <a:t>5/14/2021</a:t>
             </a:fld>
             <a:endParaRPr lang="en-US" dirty="0"/>
           </a:p>
@@ -624,10 +637,9 @@
           <a:lstStyle/>
           <a:p>
             <a:r>
-              <a:rPr kumimoji="0" lang="en-US" smtClean="0"/>
+              <a:rPr kumimoji="0" lang="en-US"/>
               <a:t>Click to edit Master title style</a:t>
             </a:r>
-            <a:endParaRPr kumimoji="0" lang="en-US"/>
           </a:p>
         </p:txBody>
       </p:sp>
@@ -653,35 +665,35 @@
           <a:p>
             <a:pPr lvl="0" eaLnBrk="1" latinLnBrk="0" hangingPunct="1"/>
             <a:r>
-              <a:rPr lang="en-US" smtClean="0"/>
+              <a:rPr lang="en-US"/>
               <a:t>Click to edit Master text styles</a:t>
             </a:r>
           </a:p>
           <a:p>
             <a:pPr lvl="1" eaLnBrk="1" latinLnBrk="0" hangingPunct="1"/>
             <a:r>
-              <a:rPr lang="en-US" smtClean="0"/>
+              <a:rPr lang="en-US"/>
               <a:t>Second level</a:t>
             </a:r>
           </a:p>
           <a:p>
             <a:pPr lvl="2" eaLnBrk="1" latinLnBrk="0" hangingPunct="1"/>
             <a:r>
-              <a:rPr lang="en-US" smtClean="0"/>
+              <a:rPr lang="en-US"/>
               <a:t>Third level</a:t>
             </a:r>
           </a:p>
           <a:p>
             <a:pPr lvl="3" eaLnBrk="1" latinLnBrk="0" hangingPunct="1"/>
             <a:r>
-              <a:rPr lang="en-US" smtClean="0"/>
+              <a:rPr lang="en-US"/>
               <a:t>Fourth level</a:t>
             </a:r>
           </a:p>
           <a:p>
             <a:pPr lvl="4" eaLnBrk="1" latinLnBrk="0" hangingPunct="1"/>
             <a:r>
-              <a:rPr lang="en-US" smtClean="0"/>
+              <a:rPr lang="en-US"/>
               <a:t>Fifth level</a:t>
             </a:r>
             <a:endParaRPr kumimoji="0" lang="en-US"/>
@@ -706,7 +718,7 @@
             <a:fld id="{36E064BB-D46D-4FB1-B399-7F9F6915DB6C}" type="datetimeFigureOut">
               <a:rPr lang="en-US" smtClean="0"/>
               <a:pPr/>
-              <a:t>12/5/2020</a:t>
+              <a:t>5/14/2021</a:t>
             </a:fld>
             <a:endParaRPr lang="en-US" dirty="0"/>
           </a:p>
@@ -801,10 +813,9 @@
           <a:lstStyle/>
           <a:p>
             <a:r>
-              <a:rPr kumimoji="0" lang="en-US" smtClean="0"/>
+              <a:rPr kumimoji="0" lang="en-US"/>
               <a:t>Click to edit Master title style</a:t>
             </a:r>
-            <a:endParaRPr kumimoji="0" lang="en-US"/>
           </a:p>
         </p:txBody>
       </p:sp>
@@ -830,35 +841,35 @@
           <a:p>
             <a:pPr lvl="0" eaLnBrk="1" latinLnBrk="0" hangingPunct="1"/>
             <a:r>
-              <a:rPr lang="en-US" smtClean="0"/>
+              <a:rPr lang="en-US"/>
               <a:t>Click to edit Master text styles</a:t>
             </a:r>
           </a:p>
           <a:p>
             <a:pPr lvl="1" eaLnBrk="1" latinLnBrk="0" hangingPunct="1"/>
             <a:r>
-              <a:rPr lang="en-US" smtClean="0"/>
+              <a:rPr lang="en-US"/>
               <a:t>Second level</a:t>
             </a:r>
           </a:p>
           <a:p>
             <a:pPr lvl="2" eaLnBrk="1" latinLnBrk="0" hangingPunct="1"/>
             <a:r>
-              <a:rPr lang="en-US" smtClean="0"/>
+              <a:rPr lang="en-US"/>
               <a:t>Third level</a:t>
             </a:r>
           </a:p>
           <a:p>
             <a:pPr lvl="3" eaLnBrk="1" latinLnBrk="0" hangingPunct="1"/>
             <a:r>
-              <a:rPr lang="en-US" smtClean="0"/>
+              <a:rPr lang="en-US"/>
               <a:t>Fourth level</a:t>
             </a:r>
           </a:p>
           <a:p>
             <a:pPr lvl="4" eaLnBrk="1" latinLnBrk="0" hangingPunct="1"/>
             <a:r>
-              <a:rPr lang="en-US" smtClean="0"/>
+              <a:rPr lang="en-US"/>
               <a:t>Fifth level</a:t>
             </a:r>
             <a:endParaRPr kumimoji="0" lang="en-US"/>
@@ -888,7 +899,7 @@
             <a:fld id="{36E064BB-D46D-4FB1-B399-7F9F6915DB6C}" type="datetimeFigureOut">
               <a:rPr lang="en-US" smtClean="0"/>
               <a:pPr/>
-              <a:t>12/5/2020</a:t>
+              <a:t>5/14/2021</a:t>
             </a:fld>
             <a:endParaRPr lang="en-US" dirty="0"/>
           </a:p>
@@ -1137,7 +1148,7 @@
             <a:fld id="{36E064BB-D46D-4FB1-B399-7F9F6915DB6C}" type="datetimeFigureOut">
               <a:rPr lang="en-US" smtClean="0"/>
               <a:pPr/>
-              <a:t>12/5/2020</a:t>
+              <a:t>5/14/2021</a:t>
             </a:fld>
             <a:endParaRPr lang="en-US" dirty="0"/>
           </a:p>
@@ -1306,10 +1317,9 @@
           </a:lstStyle>
           <a:p>
             <a:r>
-              <a:rPr kumimoji="0" lang="en-US" smtClean="0"/>
+              <a:rPr kumimoji="0" lang="en-US"/>
               <a:t>Click to edit Master title style</a:t>
             </a:r>
-            <a:endParaRPr kumimoji="0" lang="en-US"/>
           </a:p>
         </p:txBody>
       </p:sp>
@@ -1386,7 +1396,7 @@
           <a:p>
             <a:pPr lvl="0" eaLnBrk="1" latinLnBrk="0" hangingPunct="1"/>
             <a:r>
-              <a:rPr kumimoji="0" lang="en-US" smtClean="0"/>
+              <a:rPr kumimoji="0" lang="en-US"/>
               <a:t>Click to edit Master text styles</a:t>
             </a:r>
           </a:p>
@@ -1437,10 +1447,9 @@
           </a:lstStyle>
           <a:p>
             <a:r>
-              <a:rPr kumimoji="0" lang="en-US" smtClean="0"/>
+              <a:rPr kumimoji="0" lang="en-US"/>
               <a:t>Click to edit Master title style</a:t>
             </a:r>
-            <a:endParaRPr kumimoji="0" lang="en-US"/>
           </a:p>
         </p:txBody>
       </p:sp>
@@ -1482,35 +1491,35 @@
           <a:p>
             <a:pPr lvl="0" eaLnBrk="1" latinLnBrk="0" hangingPunct="1"/>
             <a:r>
-              <a:rPr lang="en-US" smtClean="0"/>
+              <a:rPr lang="en-US"/>
               <a:t>Click to edit Master text styles</a:t>
             </a:r>
           </a:p>
           <a:p>
             <a:pPr lvl="1" eaLnBrk="1" latinLnBrk="0" hangingPunct="1"/>
             <a:r>
-              <a:rPr lang="en-US" smtClean="0"/>
+              <a:rPr lang="en-US"/>
               <a:t>Second level</a:t>
             </a:r>
           </a:p>
           <a:p>
             <a:pPr lvl="2" eaLnBrk="1" latinLnBrk="0" hangingPunct="1"/>
             <a:r>
-              <a:rPr lang="en-US" smtClean="0"/>
+              <a:rPr lang="en-US"/>
               <a:t>Third level</a:t>
             </a:r>
           </a:p>
           <a:p>
             <a:pPr lvl="3" eaLnBrk="1" latinLnBrk="0" hangingPunct="1"/>
             <a:r>
-              <a:rPr lang="en-US" smtClean="0"/>
+              <a:rPr lang="en-US"/>
               <a:t>Fourth level</a:t>
             </a:r>
           </a:p>
           <a:p>
             <a:pPr lvl="4" eaLnBrk="1" latinLnBrk="0" hangingPunct="1"/>
             <a:r>
-              <a:rPr lang="en-US" smtClean="0"/>
+              <a:rPr lang="en-US"/>
               <a:t>Fifth level</a:t>
             </a:r>
             <a:endParaRPr kumimoji="0" lang="en-US"/>
@@ -1555,35 +1564,35 @@
           <a:p>
             <a:pPr lvl="0" eaLnBrk="1" latinLnBrk="0" hangingPunct="1"/>
             <a:r>
-              <a:rPr lang="en-US" smtClean="0"/>
+              <a:rPr lang="en-US"/>
               <a:t>Click to edit Master text styles</a:t>
             </a:r>
           </a:p>
           <a:p>
             <a:pPr lvl="1" eaLnBrk="1" latinLnBrk="0" hangingPunct="1"/>
             <a:r>
-              <a:rPr lang="en-US" smtClean="0"/>
+              <a:rPr lang="en-US"/>
               <a:t>Second level</a:t>
             </a:r>
           </a:p>
           <a:p>
             <a:pPr lvl="2" eaLnBrk="1" latinLnBrk="0" hangingPunct="1"/>
             <a:r>
-              <a:rPr lang="en-US" smtClean="0"/>
+              <a:rPr lang="en-US"/>
               <a:t>Third level</a:t>
             </a:r>
           </a:p>
           <a:p>
             <a:pPr lvl="3" eaLnBrk="1" latinLnBrk="0" hangingPunct="1"/>
             <a:r>
-              <a:rPr lang="en-US" smtClean="0"/>
+              <a:rPr lang="en-US"/>
               <a:t>Fourth level</a:t>
             </a:r>
           </a:p>
           <a:p>
             <a:pPr lvl="4" eaLnBrk="1" latinLnBrk="0" hangingPunct="1"/>
             <a:r>
-              <a:rPr lang="en-US" smtClean="0"/>
+              <a:rPr lang="en-US"/>
               <a:t>Fifth level</a:t>
             </a:r>
             <a:endParaRPr kumimoji="0" lang="en-US"/>
@@ -1613,7 +1622,7 @@
             <a:fld id="{36E064BB-D46D-4FB1-B399-7F9F6915DB6C}" type="datetimeFigureOut">
               <a:rPr lang="en-US" smtClean="0"/>
               <a:pPr/>
-              <a:t>12/5/2020</a:t>
+              <a:t>5/14/2021</a:t>
             </a:fld>
             <a:endParaRPr lang="en-US" dirty="0"/>
           </a:p>
@@ -1736,10 +1745,9 @@
           </a:lstStyle>
           <a:p>
             <a:r>
-              <a:rPr kumimoji="0" lang="en-US" smtClean="0"/>
+              <a:rPr kumimoji="0" lang="en-US"/>
               <a:t>Click to edit Master title style</a:t>
             </a:r>
-            <a:endParaRPr kumimoji="0" lang="en-US"/>
           </a:p>
         </p:txBody>
       </p:sp>
@@ -1796,7 +1804,7 @@
           <a:p>
             <a:pPr lvl="0" eaLnBrk="1" latinLnBrk="0" hangingPunct="1"/>
             <a:r>
-              <a:rPr kumimoji="0" lang="en-US" smtClean="0"/>
+              <a:rPr kumimoji="0" lang="en-US"/>
               <a:t>Click to edit Master text styles</a:t>
             </a:r>
           </a:p>
@@ -1855,7 +1863,7 @@
           <a:p>
             <a:pPr lvl="0" eaLnBrk="1" latinLnBrk="0" hangingPunct="1"/>
             <a:r>
-              <a:rPr kumimoji="0" lang="en-US" smtClean="0"/>
+              <a:rPr kumimoji="0" lang="en-US"/>
               <a:t>Click to edit Master text styles</a:t>
             </a:r>
           </a:p>
@@ -1899,35 +1907,35 @@
           <a:p>
             <a:pPr lvl="0" eaLnBrk="1" latinLnBrk="0" hangingPunct="1"/>
             <a:r>
-              <a:rPr lang="en-US" smtClean="0"/>
+              <a:rPr lang="en-US"/>
               <a:t>Click to edit Master text styles</a:t>
             </a:r>
           </a:p>
           <a:p>
             <a:pPr lvl="1" eaLnBrk="1" latinLnBrk="0" hangingPunct="1"/>
             <a:r>
-              <a:rPr lang="en-US" smtClean="0"/>
+              <a:rPr lang="en-US"/>
               <a:t>Second level</a:t>
             </a:r>
           </a:p>
           <a:p>
             <a:pPr lvl="2" eaLnBrk="1" latinLnBrk="0" hangingPunct="1"/>
             <a:r>
-              <a:rPr lang="en-US" smtClean="0"/>
+              <a:rPr lang="en-US"/>
               <a:t>Third level</a:t>
             </a:r>
           </a:p>
           <a:p>
             <a:pPr lvl="3" eaLnBrk="1" latinLnBrk="0" hangingPunct="1"/>
             <a:r>
-              <a:rPr lang="en-US" smtClean="0"/>
+              <a:rPr lang="en-US"/>
               <a:t>Fourth level</a:t>
             </a:r>
           </a:p>
           <a:p>
             <a:pPr lvl="4" eaLnBrk="1" latinLnBrk="0" hangingPunct="1"/>
             <a:r>
-              <a:rPr lang="en-US" smtClean="0"/>
+              <a:rPr lang="en-US"/>
               <a:t>Fifth level</a:t>
             </a:r>
             <a:endParaRPr kumimoji="0" lang="en-US"/>
@@ -1972,35 +1980,35 @@
           <a:p>
             <a:pPr lvl="0" eaLnBrk="1" latinLnBrk="0" hangingPunct="1"/>
             <a:r>
-              <a:rPr lang="en-US" smtClean="0"/>
+              <a:rPr lang="en-US"/>
               <a:t>Click to edit Master text styles</a:t>
             </a:r>
           </a:p>
           <a:p>
             <a:pPr lvl="1" eaLnBrk="1" latinLnBrk="0" hangingPunct="1"/>
             <a:r>
-              <a:rPr lang="en-US" smtClean="0"/>
+              <a:rPr lang="en-US"/>
               <a:t>Second level</a:t>
             </a:r>
           </a:p>
           <a:p>
             <a:pPr lvl="2" eaLnBrk="1" latinLnBrk="0" hangingPunct="1"/>
             <a:r>
-              <a:rPr lang="en-US" smtClean="0"/>
+              <a:rPr lang="en-US"/>
               <a:t>Third level</a:t>
             </a:r>
           </a:p>
           <a:p>
             <a:pPr lvl="3" eaLnBrk="1" latinLnBrk="0" hangingPunct="1"/>
             <a:r>
-              <a:rPr lang="en-US" smtClean="0"/>
+              <a:rPr lang="en-US"/>
               <a:t>Fourth level</a:t>
             </a:r>
           </a:p>
           <a:p>
             <a:pPr lvl="4" eaLnBrk="1" latinLnBrk="0" hangingPunct="1"/>
             <a:r>
-              <a:rPr lang="en-US" smtClean="0"/>
+              <a:rPr lang="en-US"/>
               <a:t>Fifth level</a:t>
             </a:r>
             <a:endParaRPr kumimoji="0" lang="en-US"/>
@@ -2030,7 +2038,7 @@
             <a:fld id="{36E064BB-D46D-4FB1-B399-7F9F6915DB6C}" type="datetimeFigureOut">
               <a:rPr lang="en-US" smtClean="0"/>
               <a:pPr/>
-              <a:t>12/5/2020</a:t>
+              <a:t>5/14/2021</a:t>
             </a:fld>
             <a:endParaRPr lang="en-US" dirty="0"/>
           </a:p>
@@ -2138,10 +2146,9 @@
           </a:lstStyle>
           <a:p>
             <a:r>
-              <a:rPr kumimoji="0" lang="en-US" smtClean="0"/>
+              <a:rPr kumimoji="0" lang="en-US"/>
               <a:t>Click to edit Master title style</a:t>
             </a:r>
-            <a:endParaRPr kumimoji="0" lang="en-US"/>
           </a:p>
         </p:txBody>
       </p:sp>
@@ -2163,7 +2170,7 @@
             <a:fld id="{36E064BB-D46D-4FB1-B399-7F9F6915DB6C}" type="datetimeFigureOut">
               <a:rPr lang="en-US" smtClean="0"/>
               <a:pPr/>
-              <a:t>12/5/2020</a:t>
+              <a:t>5/14/2021</a:t>
             </a:fld>
             <a:endParaRPr lang="en-US" dirty="0"/>
           </a:p>
@@ -2260,7 +2267,7 @@
             <a:fld id="{36E064BB-D46D-4FB1-B399-7F9F6915DB6C}" type="datetimeFigureOut">
               <a:rPr lang="en-US" smtClean="0"/>
               <a:pPr/>
-              <a:t>12/5/2020</a:t>
+              <a:t>5/14/2021</a:t>
             </a:fld>
             <a:endParaRPr lang="en-US" dirty="0"/>
           </a:p>
@@ -2378,10 +2385,9 @@
           </a:lstStyle>
           <a:p>
             <a:r>
-              <a:rPr kumimoji="0" lang="en-US" smtClean="0"/>
+              <a:rPr kumimoji="0" lang="en-US"/>
               <a:t>Click to edit Master title style</a:t>
             </a:r>
-            <a:endParaRPr kumimoji="0" lang="en-US"/>
           </a:p>
         </p:txBody>
       </p:sp>
@@ -2431,7 +2437,7 @@
           <a:p>
             <a:pPr lvl="0" eaLnBrk="1" latinLnBrk="0" hangingPunct="1"/>
             <a:r>
-              <a:rPr kumimoji="0" lang="en-US" smtClean="0"/>
+              <a:rPr kumimoji="0" lang="en-US"/>
               <a:t>Click to edit Master text styles</a:t>
             </a:r>
           </a:p>
@@ -2478,35 +2484,35 @@
           <a:p>
             <a:pPr lvl="0" eaLnBrk="1" latinLnBrk="0" hangingPunct="1"/>
             <a:r>
-              <a:rPr lang="en-US" smtClean="0"/>
+              <a:rPr lang="en-US"/>
               <a:t>Click to edit Master text styles</a:t>
             </a:r>
           </a:p>
           <a:p>
             <a:pPr lvl="1" eaLnBrk="1" latinLnBrk="0" hangingPunct="1"/>
             <a:r>
-              <a:rPr lang="en-US" smtClean="0"/>
+              <a:rPr lang="en-US"/>
               <a:t>Second level</a:t>
             </a:r>
           </a:p>
           <a:p>
             <a:pPr lvl="2" eaLnBrk="1" latinLnBrk="0" hangingPunct="1"/>
             <a:r>
-              <a:rPr lang="en-US" smtClean="0"/>
+              <a:rPr lang="en-US"/>
               <a:t>Third level</a:t>
             </a:r>
           </a:p>
           <a:p>
             <a:pPr lvl="3" eaLnBrk="1" latinLnBrk="0" hangingPunct="1"/>
             <a:r>
-              <a:rPr lang="en-US" smtClean="0"/>
+              <a:rPr lang="en-US"/>
               <a:t>Fourth level</a:t>
             </a:r>
           </a:p>
           <a:p>
             <a:pPr lvl="4" eaLnBrk="1" latinLnBrk="0" hangingPunct="1"/>
             <a:r>
-              <a:rPr lang="en-US" smtClean="0"/>
+              <a:rPr lang="en-US"/>
               <a:t>Fifth level</a:t>
             </a:r>
             <a:endParaRPr kumimoji="0" lang="en-US"/>
@@ -2540,7 +2546,7 @@
             <a:fld id="{36E064BB-D46D-4FB1-B399-7F9F6915DB6C}" type="datetimeFigureOut">
               <a:rPr lang="en-US" smtClean="0"/>
               <a:pPr/>
-              <a:t>12/5/2020</a:t>
+              <a:t>5/14/2021</a:t>
             </a:fld>
             <a:endParaRPr lang="en-US" dirty="0"/>
           </a:p>
@@ -2663,10 +2669,9 @@
           </a:lstStyle>
           <a:p>
             <a:r>
-              <a:rPr kumimoji="0" lang="en-US" smtClean="0"/>
+              <a:rPr kumimoji="0" lang="en-US"/>
               <a:t>Click to edit Master title style</a:t>
             </a:r>
-            <a:endParaRPr kumimoji="0" lang="en-US"/>
           </a:p>
         </p:txBody>
       </p:sp>
@@ -2701,10 +2706,9 @@
           </a:lstStyle>
           <a:p>
             <a:r>
-              <a:rPr kumimoji="0" lang="en-US" dirty="0" smtClean="0"/>
+              <a:rPr kumimoji="0" lang="en-US" dirty="0"/>
               <a:t>Click icon to add picture</a:t>
             </a:r>
-            <a:endParaRPr kumimoji="0" lang="en-US" dirty="0"/>
           </a:p>
         </p:txBody>
       </p:sp>
@@ -2761,7 +2765,7 @@
           <a:p>
             <a:pPr lvl="0" eaLnBrk="1" latinLnBrk="0" hangingPunct="1"/>
             <a:r>
-              <a:rPr kumimoji="0" lang="en-US" smtClean="0"/>
+              <a:rPr kumimoji="0" lang="en-US"/>
               <a:t>Click to edit Master text styles</a:t>
             </a:r>
           </a:p>
@@ -2794,7 +2798,7 @@
             <a:fld id="{36E064BB-D46D-4FB1-B399-7F9F6915DB6C}" type="datetimeFigureOut">
               <a:rPr lang="en-US" smtClean="0"/>
               <a:pPr/>
-              <a:t>12/5/2020</a:t>
+              <a:t>5/14/2021</a:t>
             </a:fld>
             <a:endParaRPr lang="en-US" dirty="0"/>
           </a:p>
@@ -3065,10 +3069,9 @@
           <a:lstStyle/>
           <a:p>
             <a:r>
-              <a:rPr kumimoji="0" lang="en-US" smtClean="0"/>
+              <a:rPr kumimoji="0" lang="en-US"/>
               <a:t>Click to edit Master title style</a:t>
             </a:r>
-            <a:endParaRPr kumimoji="0" lang="en-US"/>
           </a:p>
         </p:txBody>
       </p:sp>
@@ -3099,38 +3102,37 @@
           <a:p>
             <a:pPr lvl="0" eaLnBrk="1" latinLnBrk="0" hangingPunct="1"/>
             <a:r>
-              <a:rPr kumimoji="0" lang="en-US" smtClean="0"/>
+              <a:rPr kumimoji="0" lang="en-US"/>
               <a:t>Click to edit Master text styles</a:t>
             </a:r>
           </a:p>
           <a:p>
             <a:pPr lvl="1" eaLnBrk="1" latinLnBrk="0" hangingPunct="1"/>
             <a:r>
-              <a:rPr kumimoji="0" lang="en-US" smtClean="0"/>
+              <a:rPr kumimoji="0" lang="en-US"/>
               <a:t>Second level</a:t>
             </a:r>
           </a:p>
           <a:p>
             <a:pPr lvl="2" eaLnBrk="1" latinLnBrk="0" hangingPunct="1"/>
             <a:r>
-              <a:rPr kumimoji="0" lang="en-US" smtClean="0"/>
+              <a:rPr kumimoji="0" lang="en-US"/>
               <a:t>Third level</a:t>
             </a:r>
           </a:p>
           <a:p>
             <a:pPr lvl="3" eaLnBrk="1" latinLnBrk="0" hangingPunct="1"/>
             <a:r>
-              <a:rPr kumimoji="0" lang="en-US" smtClean="0"/>
+              <a:rPr kumimoji="0" lang="en-US"/>
               <a:t>Fourth level</a:t>
             </a:r>
           </a:p>
           <a:p>
             <a:pPr lvl="4" eaLnBrk="1" latinLnBrk="0" hangingPunct="1"/>
             <a:r>
-              <a:rPr kumimoji="0" lang="en-US" smtClean="0"/>
+              <a:rPr kumimoji="0" lang="en-US"/>
               <a:t>Fifth level</a:t>
             </a:r>
-            <a:endParaRPr kumimoji="0" lang="en-US"/>
           </a:p>
         </p:txBody>
       </p:sp>
@@ -3168,7 +3170,7 @@
             <a:fld id="{36E064BB-D46D-4FB1-B399-7F9F6915DB6C}" type="datetimeFigureOut">
               <a:rPr lang="en-US" smtClean="0"/>
               <a:pPr/>
-              <a:t>12/5/2020</a:t>
+              <a:t>5/14/2021</a:t>
             </a:fld>
             <a:endParaRPr lang="en-US" dirty="0"/>
           </a:p>
@@ -3612,12 +3614,27 @@
           <a:p>
             <a:pPr algn="l"/>
             <a:r>
-              <a:rPr lang="en-IN" sz="4800" b="1" dirty="0" smtClean="0">
+              <a:rPr lang="en-IN" sz="4800" b="1" dirty="0">
                 <a:solidFill>
                   <a:schemeClr val="tx1"/>
                 </a:solidFill>
               </a:rPr>
-              <a:t>Presentation On Scholarship Calculator</a:t>
+              <a:t>Presentation On </a:t>
+            </a:r>
+            <a:br>
+              <a:rPr lang="en-IN" sz="4800" b="1" dirty="0">
+                <a:solidFill>
+                  <a:schemeClr val="tx1"/>
+                </a:solidFill>
+              </a:rPr>
+            </a:br>
+            <a:r>
+              <a:rPr lang="en-IN" sz="4800" b="1" dirty="0">
+                <a:solidFill>
+                  <a:schemeClr val="tx1"/>
+                </a:solidFill>
+              </a:rPr>
+              <a:t>Android Chat Application</a:t>
             </a:r>
             <a:endParaRPr lang="en-US" sz="4800" b="1" dirty="0">
               <a:solidFill>
@@ -3645,7 +3662,7 @@
         </p:spPr>
         <p:txBody>
           <a:bodyPr>
-            <a:normAutofit/>
+            <a:normAutofit fontScale="77500" lnSpcReduction="20000"/>
           </a:bodyPr>
           <a:lstStyle/>
           <a:p>
@@ -3653,7 +3670,7 @@
               <a:buNone/>
             </a:pPr>
             <a:r>
-              <a:rPr lang="en-IN" sz="3200" b="1" dirty="0" smtClean="0"/>
+              <a:rPr lang="en-IN" sz="3200" b="1" dirty="0"/>
               <a:t>Presented by –</a:t>
             </a:r>
           </a:p>
@@ -3662,8 +3679,8 @@
               <a:buNone/>
             </a:pPr>
             <a:r>
-              <a:rPr lang="en-IN" sz="3200" b="1" dirty="0" smtClean="0"/>
-              <a:t>Group 9</a:t>
+              <a:rPr lang="en-IN" sz="3200" b="1" dirty="0"/>
+              <a:t>Rahul Joshi</a:t>
             </a:r>
             <a:endParaRPr lang="en-US" sz="3200" b="1" dirty="0"/>
           </a:p>
@@ -3687,7 +3704,7 @@
         </p:spPr>
         <p:txBody>
           <a:bodyPr>
-            <a:normAutofit/>
+            <a:normAutofit fontScale="77500" lnSpcReduction="20000"/>
           </a:bodyPr>
           <a:lstStyle/>
           <a:p>
@@ -3695,8 +3712,11 @@
               <a:buNone/>
             </a:pPr>
             <a:r>
-              <a:rPr lang="en-IN" sz="3200" b="1" dirty="0" smtClean="0"/>
-              <a:t>Presented to –</a:t>
+              <a:rPr lang="en-IN" sz="3600" b="1" dirty="0">
+                <a:latin typeface="Arial" pitchFamily="34" charset="0"/>
+                <a:cs typeface="Arial" pitchFamily="34" charset="0"/>
+              </a:rPr>
+              <a:t>Project Supervisor</a:t>
             </a:r>
           </a:p>
           <a:p>
@@ -3704,10 +3724,31 @@
               <a:buNone/>
             </a:pPr>
             <a:r>
-              <a:rPr lang="en-IN" sz="3200" b="1" dirty="0" smtClean="0"/>
-              <a:t>Dr Mukesh Joshi</a:t>
-            </a:r>
-            <a:endParaRPr lang="en-US" sz="3200" b="1" dirty="0"/>
+              <a:rPr lang="en-IN" sz="3200" dirty="0">
+                <a:latin typeface="Times New Roman" pitchFamily="18" charset="0"/>
+                <a:cs typeface="Times New Roman" pitchFamily="18" charset="0"/>
+              </a:rPr>
+              <a:t>Mr. Akash Chauhan</a:t>
+            </a:r>
+          </a:p>
+          <a:p>
+            <a:pPr>
+              <a:buNone/>
+            </a:pPr>
+            <a:r>
+              <a:rPr lang="en-IN" sz="3200" dirty="0" err="1">
+                <a:latin typeface="Times New Roman" pitchFamily="18" charset="0"/>
+                <a:cs typeface="Times New Roman" pitchFamily="18" charset="0"/>
+              </a:rPr>
+              <a:t>Dr.</a:t>
+            </a:r>
+            <a:r>
+              <a:rPr lang="en-IN" sz="3200" dirty="0">
+                <a:latin typeface="Times New Roman" pitchFamily="18" charset="0"/>
+                <a:cs typeface="Times New Roman" pitchFamily="18" charset="0"/>
+              </a:rPr>
+              <a:t> Naveen Tiwari</a:t>
+            </a:r>
           </a:p>
         </p:txBody>
       </p:sp>
@@ -3749,13 +3790,6 @@
   <p:clrMapOvr>
     <a:masterClrMapping/>
   </p:clrMapOvr>
-  <p:timing>
-    <p:tnLst>
-      <p:par>
-        <p:cTn id="1" dur="indefinite" restart="never" nodeType="tmRoot"/>
-      </p:par>
-    </p:tnLst>
-  </p:timing>
 </p:sld>
 </file>
 
@@ -3778,7 +3812,7 @@
       </p:grpSpPr>
       <p:sp>
         <p:nvSpPr>
-          <p:cNvPr id="4" name="Title 3"/>
+          <p:cNvPr id="2" name="Title 1"/>
           <p:cNvSpPr>
             <a:spLocks noGrp="1"/>
           </p:cNvSpPr>
@@ -3789,83 +3823,105 @@
         <p:spPr/>
         <p:txBody>
           <a:bodyPr>
-            <a:normAutofit/>
+            <a:noAutofit/>
           </a:bodyPr>
           <a:lstStyle/>
           <a:p>
             <a:r>
-              <a:rPr lang="en-IN" sz="6600" b="1" dirty="0" smtClean="0"/>
-              <a:t>Salient Features</a:t>
-            </a:r>
-            <a:endParaRPr lang="en-US" sz="6600" b="1" dirty="0"/>
-          </a:p>
-        </p:txBody>
-      </p:sp>
-      <p:sp>
-        <p:nvSpPr>
-          <p:cNvPr id="5" name="Content Placeholder 4"/>
-          <p:cNvSpPr>
-            <a:spLocks noGrp="1"/>
-          </p:cNvSpPr>
-          <p:nvPr>
-            <p:ph idx="1"/>
-          </p:nvPr>
-        </p:nvSpPr>
-        <p:spPr/>
-        <p:txBody>
-          <a:bodyPr/>
-          <a:lstStyle/>
-          <a:p>
-            <a:pPr>
-              <a:buFont typeface="Wingdings" pitchFamily="2" charset="2"/>
-              <a:buChar char="q"/>
-            </a:pPr>
-            <a:r>
-              <a:rPr lang="en-IN" dirty="0" smtClean="0"/>
-              <a:t>Effective and efficient way of getting accurate details.</a:t>
-            </a:r>
-          </a:p>
-          <a:p>
-            <a:pPr>
-              <a:buFont typeface="Wingdings" pitchFamily="2" charset="2"/>
-              <a:buChar char="q"/>
-            </a:pPr>
-            <a:r>
-              <a:rPr lang="en-IN" dirty="0" smtClean="0"/>
-              <a:t>Extra technical knowledge is not required to operate the system.</a:t>
-            </a:r>
-          </a:p>
-          <a:p>
-            <a:pPr>
-              <a:buFont typeface="Wingdings" pitchFamily="2" charset="2"/>
-              <a:buChar char="q"/>
-            </a:pPr>
-            <a:r>
-              <a:rPr lang="en-IN" dirty="0" smtClean="0"/>
-              <a:t>Available at anytime, anywhere and to anyone.</a:t>
-            </a:r>
-          </a:p>
-          <a:p>
-            <a:pPr>
-              <a:buFont typeface="Wingdings" pitchFamily="2" charset="2"/>
-              <a:buChar char="q"/>
-            </a:pPr>
-            <a:endParaRPr lang="en-US" dirty="0"/>
-          </a:p>
-        </p:txBody>
-      </p:sp>
+              <a:rPr lang="en-IN" sz="5400" b="1" dirty="0">
+                <a:solidFill>
+                  <a:schemeClr val="tx1"/>
+                </a:solidFill>
+              </a:rPr>
+              <a:t>Application Snapshots</a:t>
+            </a:r>
+            <a:endParaRPr lang="en-US" sz="4800" dirty="0"/>
+          </a:p>
+        </p:txBody>
+      </p:sp>
+      <p:pic>
+        <p:nvPicPr>
+          <p:cNvPr id="7" name="Picture 6">
+            <a:extLst>
+              <a:ext uri="{FF2B5EF4-FFF2-40B4-BE49-F238E27FC236}">
+                <a16:creationId xmlns:a16="http://schemas.microsoft.com/office/drawing/2014/main" id="{80DA5E14-2B97-420C-B955-076494CD273B}"/>
+              </a:ext>
+            </a:extLst>
+          </p:cNvPr>
+          <p:cNvPicPr/>
+          <p:nvPr/>
+        </p:nvPicPr>
+        <p:blipFill>
+          <a:blip r:embed="rId2">
+            <a:extLst>
+              <a:ext uri="{28A0092B-C50C-407E-A947-70E740481C1C}">
+                <a14:useLocalDpi xmlns:a14="http://schemas.microsoft.com/office/drawing/2010/main" val="0"/>
+              </a:ext>
+            </a:extLst>
+          </a:blip>
+          <a:srcRect/>
+          <a:stretch>
+            <a:fillRect/>
+          </a:stretch>
+        </p:blipFill>
+        <p:spPr bwMode="auto">
+          <a:xfrm>
+            <a:off x="427674" y="1412776"/>
+            <a:ext cx="4248472" cy="5445224"/>
+          </a:xfrm>
+          <a:prstGeom prst="rect">
+            <a:avLst/>
+          </a:prstGeom>
+          <a:noFill/>
+          <a:ln>
+            <a:noFill/>
+          </a:ln>
+        </p:spPr>
+      </p:pic>
+      <p:pic>
+        <p:nvPicPr>
+          <p:cNvPr id="8" name="Picture 7">
+            <a:extLst>
+              <a:ext uri="{FF2B5EF4-FFF2-40B4-BE49-F238E27FC236}">
+                <a16:creationId xmlns:a16="http://schemas.microsoft.com/office/drawing/2014/main" id="{1F04EBD4-B9C5-4523-BF94-4774C3CD46C1}"/>
+              </a:ext>
+            </a:extLst>
+          </p:cNvPr>
+          <p:cNvPicPr/>
+          <p:nvPr/>
+        </p:nvPicPr>
+        <p:blipFill>
+          <a:blip r:embed="rId3">
+            <a:extLst>
+              <a:ext uri="{28A0092B-C50C-407E-A947-70E740481C1C}">
+                <a14:useLocalDpi xmlns:a14="http://schemas.microsoft.com/office/drawing/2010/main" val="0"/>
+              </a:ext>
+            </a:extLst>
+          </a:blip>
+          <a:srcRect/>
+          <a:stretch>
+            <a:fillRect/>
+          </a:stretch>
+        </p:blipFill>
+        <p:spPr bwMode="auto">
+          <a:xfrm>
+            <a:off x="4705672" y="1404893"/>
+            <a:ext cx="4130580" cy="5445224"/>
+          </a:xfrm>
+          <a:prstGeom prst="rect">
+            <a:avLst/>
+          </a:prstGeom>
+          <a:noFill/>
+          <a:ln>
+            <a:noFill/>
+          </a:ln>
+        </p:spPr>
+      </p:pic>
     </p:spTree>
   </p:cSld>
   <p:clrMapOvr>
     <a:masterClrMapping/>
   </p:clrMapOvr>
-  <p:timing>
-    <p:tnLst>
-      <p:par>
-        <p:cTn id="1" dur="indefinite" restart="never" nodeType="tmRoot"/>
-      </p:par>
-    </p:tnLst>
-  </p:timing>
 </p:sld>
 </file>
 
@@ -3896,69 +3952,113 @@
             <p:ph type="title"/>
           </p:nvPr>
         </p:nvSpPr>
-        <p:spPr>
-          <a:xfrm>
-            <a:off x="0" y="267494"/>
-            <a:ext cx="9144000" cy="1732746"/>
-          </a:xfrm>
-        </p:spPr>
+        <p:spPr/>
         <p:txBody>
           <a:bodyPr>
-            <a:normAutofit fontScale="90000"/>
+            <a:noAutofit/>
           </a:bodyPr>
           <a:lstStyle/>
           <a:p>
             <a:r>
-              <a:rPr lang="en-IN" sz="6700" b="1" dirty="0" smtClean="0">
+              <a:rPr lang="en-IN" sz="5400" b="1" dirty="0">
                 <a:solidFill>
                   <a:schemeClr val="tx1"/>
                 </a:solidFill>
               </a:rPr>
               <a:t>Application Snapshots</a:t>
             </a:r>
-            <a:endParaRPr lang="en-US" i="1" dirty="0">
-              <a:solidFill>
-                <a:schemeClr val="tx1"/>
-              </a:solidFill>
-            </a:endParaRPr>
+            <a:endParaRPr lang="en-US" sz="4800" dirty="0"/>
           </a:p>
         </p:txBody>
       </p:sp>
       <p:pic>
         <p:nvPicPr>
-          <p:cNvPr id="8" name="Content Placeholder 7" descr="IMG-20201205-WA0000.jpg"/>
-          <p:cNvPicPr>
-            <a:picLocks noGrp="1" noChangeAspect="1"/>
-          </p:cNvPicPr>
-          <p:nvPr>
-            <p:ph idx="1"/>
-          </p:nvPr>
+          <p:cNvPr id="3" name="Picture 2">
+            <a:extLst>
+              <a:ext uri="{FF2B5EF4-FFF2-40B4-BE49-F238E27FC236}">
+                <a16:creationId xmlns:a16="http://schemas.microsoft.com/office/drawing/2014/main" id="{6C26CE39-5125-4EDC-BE19-A5CDBEF7595D}"/>
+              </a:ext>
+            </a:extLst>
+          </p:cNvPr>
+          <p:cNvPicPr/>
+          <p:nvPr/>
         </p:nvPicPr>
         <p:blipFill>
-          <a:blip r:embed="rId2" cstate="print"/>
+          <a:blip r:embed="rId2">
+            <a:extLst>
+              <a:ext uri="{28A0092B-C50C-407E-A947-70E740481C1C}">
+                <a14:useLocalDpi xmlns:a14="http://schemas.microsoft.com/office/drawing/2010/main" val="0"/>
+              </a:ext>
+            </a:extLst>
+          </a:blip>
+          <a:srcRect/>
           <a:stretch>
             <a:fillRect/>
           </a:stretch>
         </p:blipFill>
-        <p:spPr>
-          <a:xfrm>
-            <a:off x="457200" y="1953855"/>
-            <a:ext cx="8229600" cy="4429839"/>
-          </a:xfrm>
+        <p:spPr bwMode="auto">
+          <a:xfrm>
+            <a:off x="369412" y="1446114"/>
+            <a:ext cx="4202588" cy="5410944"/>
+          </a:xfrm>
+          <a:prstGeom prst="rect">
+            <a:avLst/>
+          </a:prstGeom>
+          <a:noFill/>
+          <a:ln>
+            <a:noFill/>
+          </a:ln>
+        </p:spPr>
+      </p:pic>
+      <p:pic>
+        <p:nvPicPr>
+          <p:cNvPr id="4" name="Picture 3">
+            <a:extLst>
+              <a:ext uri="{FF2B5EF4-FFF2-40B4-BE49-F238E27FC236}">
+                <a16:creationId xmlns:a16="http://schemas.microsoft.com/office/drawing/2014/main" id="{A382C4DE-998A-4DA5-A3FE-56A2EBFF4E79}"/>
+              </a:ext>
+            </a:extLst>
+          </p:cNvPr>
+          <p:cNvPicPr/>
+          <p:nvPr/>
+        </p:nvPicPr>
+        <p:blipFill>
+          <a:blip r:embed="rId3">
+            <a:extLst>
+              <a:ext uri="{28A0092B-C50C-407E-A947-70E740481C1C}">
+                <a14:useLocalDpi xmlns:a14="http://schemas.microsoft.com/office/drawing/2010/main" val="0"/>
+              </a:ext>
+            </a:extLst>
+          </a:blip>
+          <a:srcRect/>
+          <a:stretch>
+            <a:fillRect/>
+          </a:stretch>
+        </p:blipFill>
+        <p:spPr bwMode="auto">
+          <a:xfrm>
+            <a:off x="4598124" y="1446114"/>
+            <a:ext cx="4176464" cy="5410944"/>
+          </a:xfrm>
+          <a:prstGeom prst="rect">
+            <a:avLst/>
+          </a:prstGeom>
+          <a:noFill/>
+          <a:ln>
+            <a:noFill/>
+          </a:ln>
         </p:spPr>
       </p:pic>
     </p:spTree>
+    <p:extLst>
+      <p:ext uri="{BB962C8B-B14F-4D97-AF65-F5344CB8AC3E}">
+        <p14:creationId xmlns:p14="http://schemas.microsoft.com/office/powerpoint/2010/main" val="2474196460"/>
+      </p:ext>
+    </p:extLst>
   </p:cSld>
   <p:clrMapOvr>
     <a:masterClrMapping/>
   </p:clrMapOvr>
-  <p:timing>
-    <p:tnLst>
-      <p:par>
-        <p:cTn id="1" dur="indefinite" restart="never" nodeType="tmRoot"/>
-      </p:par>
-    </p:tnLst>
-  </p:timing>
 </p:sld>
 </file>
 
@@ -3997,7 +4097,7 @@
           <a:lstStyle/>
           <a:p>
             <a:r>
-              <a:rPr lang="en-IN" sz="5400" b="1" dirty="0" smtClean="0">
+              <a:rPr lang="en-IN" sz="5400" b="1" dirty="0">
                 <a:solidFill>
                   <a:schemeClr val="tx1"/>
                 </a:solidFill>
@@ -4010,39 +4110,53 @@
       </p:sp>
       <p:pic>
         <p:nvPicPr>
-          <p:cNvPr id="6" name="Content Placeholder 5" descr="IMG-20201205-WA0001.jpg"/>
-          <p:cNvPicPr>
-            <a:picLocks noGrp="1" noChangeAspect="1"/>
-          </p:cNvPicPr>
-          <p:nvPr>
-            <p:ph idx="1"/>
-          </p:nvPr>
+          <p:cNvPr id="3" name="Picture 2">
+            <a:extLst>
+              <a:ext uri="{FF2B5EF4-FFF2-40B4-BE49-F238E27FC236}">
+                <a16:creationId xmlns:a16="http://schemas.microsoft.com/office/drawing/2014/main" id="{C788EEAF-5CDC-487F-90BD-373CAE7D0481}"/>
+              </a:ext>
+            </a:extLst>
+          </p:cNvPr>
+          <p:cNvPicPr/>
+          <p:nvPr/>
         </p:nvPicPr>
         <p:blipFill>
-          <a:blip r:embed="rId2" cstate="print"/>
+          <a:blip r:embed="rId2">
+            <a:extLst>
+              <a:ext uri="{28A0092B-C50C-407E-A947-70E740481C1C}">
+                <a14:useLocalDpi xmlns:a14="http://schemas.microsoft.com/office/drawing/2010/main" val="0"/>
+              </a:ext>
+            </a:extLst>
+          </a:blip>
+          <a:srcRect/>
           <a:stretch>
             <a:fillRect/>
           </a:stretch>
         </p:blipFill>
-        <p:spPr>
-          <a:xfrm>
-            <a:off x="457200" y="1950640"/>
-            <a:ext cx="8229600" cy="4436269"/>
-          </a:xfrm>
+        <p:spPr bwMode="auto">
+          <a:xfrm>
+            <a:off x="3059832" y="1308997"/>
+            <a:ext cx="2834436" cy="5266928"/>
+          </a:xfrm>
+          <a:prstGeom prst="rect">
+            <a:avLst/>
+          </a:prstGeom>
+          <a:noFill/>
+          <a:ln>
+            <a:noFill/>
+          </a:ln>
         </p:spPr>
       </p:pic>
     </p:spTree>
+    <p:extLst>
+      <p:ext uri="{BB962C8B-B14F-4D97-AF65-F5344CB8AC3E}">
+        <p14:creationId xmlns:p14="http://schemas.microsoft.com/office/powerpoint/2010/main" val="687436436"/>
+      </p:ext>
+    </p:extLst>
   </p:cSld>
   <p:clrMapOvr>
     <a:masterClrMapping/>
   </p:clrMapOvr>
-  <p:timing>
-    <p:tnLst>
-      <p:par>
-        <p:cTn id="1" dur="indefinite" restart="never" nodeType="tmRoot"/>
-      </p:par>
-    </p:tnLst>
-  </p:timing>
 </p:sld>
 </file>
 
@@ -4081,7 +4195,7 @@
           <a:lstStyle/>
           <a:p>
             <a:r>
-              <a:rPr lang="en-IN" sz="4400" b="1" dirty="0" smtClean="0">
+              <a:rPr lang="en-IN" sz="4400" b="1" dirty="0">
                 <a:latin typeface="Arial" pitchFamily="34" charset="0"/>
                 <a:cs typeface="Arial" pitchFamily="34" charset="0"/>
               </a:rPr>
@@ -4116,8 +4230,8 @@
               <a:buChar char="q"/>
             </a:pPr>
             <a:r>
-              <a:rPr lang="en-IN" dirty="0" smtClean="0"/>
-              <a:t>The project exposed us to the latest technology in the areas of web development.</a:t>
+              <a:rPr lang="en-IN" dirty="0"/>
+              <a:t>The project exposed me to the latest technology in the areas of android development.</a:t>
             </a:r>
           </a:p>
           <a:p>
@@ -4126,8 +4240,8 @@
               <a:buChar char="q"/>
             </a:pPr>
             <a:r>
-              <a:rPr lang="en-IN" dirty="0" smtClean="0"/>
-              <a:t> Thus, this project successfully demonstrates an online based scholarship calculator. </a:t>
+              <a:rPr lang="en-IN" dirty="0"/>
+              <a:t> Thus, this project successfully demonstrates an online chatting application. </a:t>
             </a:r>
           </a:p>
           <a:p>
@@ -4136,8 +4250,8 @@
               <a:buChar char="q"/>
             </a:pPr>
             <a:r>
-              <a:rPr lang="en-IN" dirty="0" smtClean="0"/>
-              <a:t>We faced many challenges and problems during the development time. </a:t>
+              <a:rPr lang="en-IN" dirty="0"/>
+              <a:t>I faced many challenges and problems during the development time. </a:t>
             </a:r>
           </a:p>
           <a:p>
@@ -4146,16 +4260,8 @@
               <a:buChar char="q"/>
             </a:pPr>
             <a:r>
-              <a:rPr lang="en-IN" dirty="0" smtClean="0"/>
-              <a:t>It was a nice learning curve to work on web technology </a:t>
-            </a:r>
-            <a:r>
-              <a:rPr lang="en-IN" dirty="0" err="1" smtClean="0"/>
-              <a:t>aplications</a:t>
-            </a:r>
-            <a:r>
-              <a:rPr lang="en-IN" dirty="0" smtClean="0"/>
-              <a:t>.</a:t>
+              <a:rPr lang="en-IN" dirty="0"/>
+              <a:t>It was a nice learning curve to work on android applications.</a:t>
             </a:r>
           </a:p>
           <a:p>
@@ -4172,13 +4278,6 @@
   <p:clrMapOvr>
     <a:masterClrMapping/>
   </p:clrMapOvr>
-  <p:timing>
-    <p:tnLst>
-      <p:par>
-        <p:cTn id="1" dur="indefinite" restart="never" nodeType="tmRoot"/>
-      </p:par>
-    </p:tnLst>
-  </p:timing>
 </p:sld>
 </file>
 
@@ -4228,13 +4327,6 @@
   <p:clrMapOvr>
     <a:masterClrMapping/>
   </p:clrMapOvr>
-  <p:timing>
-    <p:tnLst>
-      <p:par>
-        <p:cTn id="1" dur="indefinite" restart="never" nodeType="tmRoot"/>
-      </p:par>
-    </p:tnLst>
-  </p:timing>
 </p:sld>
 </file>
 
@@ -4257,7 +4349,7 @@
       </p:grpSpPr>
       <p:sp>
         <p:nvSpPr>
-          <p:cNvPr id="5" name="Title 4"/>
+          <p:cNvPr id="2" name="Title 1"/>
           <p:cNvSpPr>
             <a:spLocks noGrp="1"/>
           </p:cNvSpPr>
@@ -4267,8 +4359,8 @@
         </p:nvSpPr>
         <p:spPr>
           <a:xfrm>
-            <a:off x="467544" y="3212976"/>
-            <a:ext cx="8229600" cy="3312368"/>
+            <a:off x="0" y="836712"/>
+            <a:ext cx="8686800" cy="1399032"/>
           </a:xfrm>
         </p:spPr>
         <p:txBody>
@@ -4277,120 +4369,15 @@
           </a:bodyPr>
           <a:lstStyle/>
           <a:p>
-            <a:r>
-              <a:rPr lang="en-IN" sz="2800" b="1" dirty="0" smtClean="0">
-                <a:solidFill>
-                  <a:schemeClr val="tx1"/>
-                </a:solidFill>
-              </a:rPr>
-              <a:t>Team Members</a:t>
-            </a:r>
-            <a:r>
-              <a:rPr lang="en-IN" sz="2600" b="1" dirty="0" smtClean="0">
-                <a:solidFill>
-                  <a:schemeClr val="tx1"/>
-                </a:solidFill>
-              </a:rPr>
-              <a:t/>
+            <a:pPr algn="ctr"/>
+            <a:r>
+              <a:rPr lang="en-US" sz="4800" b="1" dirty="0"/>
+              <a:t>Presentation Outline</a:t>
             </a:r>
             <a:br>
-              <a:rPr lang="en-IN" sz="2600" b="1" dirty="0" smtClean="0">
-                <a:solidFill>
-                  <a:schemeClr val="tx1"/>
-                </a:solidFill>
-              </a:rPr>
+              <a:rPr lang="en-US" sz="4800" dirty="0"/>
             </a:br>
-            <a:r>
-              <a:rPr lang="en-IN" sz="2400" b="1" dirty="0" smtClean="0">
-                <a:solidFill>
-                  <a:schemeClr val="tx1"/>
-                </a:solidFill>
-              </a:rPr>
-              <a:t/>
-            </a:r>
-            <a:br>
-              <a:rPr lang="en-IN" sz="2400" b="1" dirty="0" smtClean="0">
-                <a:solidFill>
-                  <a:schemeClr val="tx1"/>
-                </a:solidFill>
-              </a:rPr>
-            </a:br>
-            <a:r>
-              <a:rPr lang="en-IN" sz="2400" b="1" dirty="0" smtClean="0">
-                <a:solidFill>
-                  <a:schemeClr val="tx1"/>
-                </a:solidFill>
-              </a:rPr>
-              <a:t/>
-            </a:r>
-            <a:br>
-              <a:rPr lang="en-IN" sz="2400" b="1" dirty="0" smtClean="0">
-                <a:solidFill>
-                  <a:schemeClr val="tx1"/>
-                </a:solidFill>
-              </a:rPr>
-            </a:br>
-            <a:r>
-              <a:rPr lang="en-IN" sz="2400" b="1" dirty="0" smtClean="0">
-                <a:solidFill>
-                  <a:schemeClr val="tx1"/>
-                </a:solidFill>
-              </a:rPr>
-              <a:t/>
-            </a:r>
-            <a:br>
-              <a:rPr lang="en-IN" sz="2400" b="1" dirty="0" smtClean="0">
-                <a:solidFill>
-                  <a:schemeClr val="tx1"/>
-                </a:solidFill>
-              </a:rPr>
-            </a:br>
-            <a:r>
-              <a:rPr lang="en-IN" sz="2400" b="1" dirty="0" smtClean="0">
-                <a:solidFill>
-                  <a:schemeClr val="tx1"/>
-                </a:solidFill>
-              </a:rPr>
-              <a:t/>
-            </a:r>
-            <a:br>
-              <a:rPr lang="en-IN" sz="2400" b="1" dirty="0" smtClean="0">
-                <a:solidFill>
-                  <a:schemeClr val="tx1"/>
-                </a:solidFill>
-              </a:rPr>
-            </a:br>
-            <a:r>
-              <a:rPr lang="en-IN" sz="2400" b="1" dirty="0" smtClean="0">
-                <a:solidFill>
-                  <a:schemeClr val="tx1"/>
-                </a:solidFill>
-              </a:rPr>
-              <a:t/>
-            </a:r>
-            <a:br>
-              <a:rPr lang="en-IN" sz="2400" b="1" dirty="0" smtClean="0">
-                <a:solidFill>
-                  <a:schemeClr val="tx1"/>
-                </a:solidFill>
-              </a:rPr>
-            </a:br>
-            <a:r>
-              <a:rPr lang="en-IN" sz="2400" b="1" dirty="0" smtClean="0">
-                <a:solidFill>
-                  <a:schemeClr val="tx1"/>
-                </a:solidFill>
-              </a:rPr>
-              <a:t/>
-            </a:r>
-            <a:br>
-              <a:rPr lang="en-IN" sz="2400" b="1" dirty="0" smtClean="0">
-                <a:solidFill>
-                  <a:schemeClr val="tx1"/>
-                </a:solidFill>
-              </a:rPr>
-            </a:br>
-            <a:endParaRPr lang="en-US" sz="2400" b="1" dirty="0">
+            <a:endParaRPr lang="en-US" sz="4800" b="1" dirty="0">
               <a:solidFill>
                 <a:schemeClr val="tx1"/>
               </a:solidFill>
@@ -4400,529 +4387,129 @@
       </p:sp>
       <p:sp>
         <p:nvSpPr>
-          <p:cNvPr id="4" name="Content Placeholder 3"/>
-          <p:cNvSpPr>
-            <a:spLocks noGrp="1"/>
-          </p:cNvSpPr>
-          <p:nvPr>
-            <p:ph sz="half" idx="1"/>
-          </p:nvPr>
-        </p:nvSpPr>
-        <p:spPr>
-          <a:xfrm>
-            <a:off x="323528" y="404664"/>
-            <a:ext cx="4038600" cy="3096344"/>
+          <p:cNvPr id="3" name="Content Placeholder 2"/>
+          <p:cNvSpPr>
+            <a:spLocks noGrp="1"/>
+          </p:cNvSpPr>
+          <p:nvPr>
+            <p:ph idx="1"/>
+          </p:nvPr>
+        </p:nvSpPr>
+        <p:spPr>
+          <a:xfrm>
+            <a:off x="457200" y="2348880"/>
+            <a:ext cx="8229600" cy="4105928"/>
           </a:xfrm>
         </p:spPr>
         <p:txBody>
           <a:bodyPr>
-            <a:normAutofit/>
+            <a:normAutofit fontScale="92500" lnSpcReduction="10000"/>
           </a:bodyPr>
           <a:lstStyle/>
           <a:p>
             <a:pPr>
-              <a:buNone/>
+              <a:buFont typeface="Wingdings" pitchFamily="2" charset="2"/>
+              <a:buChar char="q"/>
             </a:pPr>
             <a:r>
-              <a:rPr lang="en-IN" sz="2800" b="1" dirty="0" smtClean="0">
-                <a:latin typeface="Arial" pitchFamily="34" charset="0"/>
-                <a:cs typeface="Arial" pitchFamily="34" charset="0"/>
-              </a:rPr>
-              <a:t>Project Supervisor</a:t>
+              <a:rPr lang="en-IN" sz="2800" dirty="0"/>
+              <a:t>Introduction</a:t>
             </a:r>
           </a:p>
           <a:p>
             <a:pPr>
-              <a:buNone/>
+              <a:buFont typeface="Wingdings" pitchFamily="2" charset="2"/>
+              <a:buChar char="q"/>
             </a:pPr>
             <a:r>
-              <a:rPr lang="en-IN" sz="2400" dirty="0" smtClean="0">
-                <a:latin typeface="Times New Roman" pitchFamily="18" charset="0"/>
-                <a:cs typeface="Times New Roman" pitchFamily="18" charset="0"/>
-              </a:rPr>
-              <a:t>Dr. Mukesh Joshi</a:t>
+              <a:rPr lang="en-IN" sz="2800" dirty="0"/>
+              <a:t>Objectives</a:t>
             </a:r>
           </a:p>
           <a:p>
             <a:pPr>
-              <a:buNone/>
+              <a:buFont typeface="Wingdings" pitchFamily="2" charset="2"/>
+              <a:buChar char="q"/>
             </a:pPr>
             <a:r>
-              <a:rPr lang="en-IN" sz="2400" dirty="0" smtClean="0">
-                <a:latin typeface="Times New Roman" pitchFamily="18" charset="0"/>
-                <a:cs typeface="Times New Roman" pitchFamily="18" charset="0"/>
-              </a:rPr>
-              <a:t>Assistant Professor </a:t>
+              <a:rPr lang="en-IN" sz="2800" dirty="0"/>
+              <a:t>Academic Objectives</a:t>
             </a:r>
           </a:p>
           <a:p>
             <a:pPr>
-              <a:buNone/>
+              <a:buFont typeface="Wingdings" pitchFamily="2" charset="2"/>
+              <a:buChar char="q"/>
             </a:pPr>
             <a:r>
-              <a:rPr lang="en-IN" sz="2400" dirty="0" smtClean="0">
-                <a:latin typeface="Times New Roman" pitchFamily="18" charset="0"/>
-                <a:cs typeface="Times New Roman" pitchFamily="18" charset="0"/>
-              </a:rPr>
-              <a:t>GEHU, Bhimtal</a:t>
+              <a:rPr lang="en-IN" sz="2800" dirty="0"/>
+              <a:t>Uses</a:t>
             </a:r>
           </a:p>
           <a:p>
             <a:pPr>
-              <a:buNone/>
+              <a:buFont typeface="Wingdings" pitchFamily="2" charset="2"/>
+              <a:buChar char="q"/>
             </a:pPr>
-            <a:endParaRPr lang="en-US" b="1" dirty="0">
-              <a:latin typeface="Arial" pitchFamily="34" charset="0"/>
-              <a:cs typeface="Arial" pitchFamily="34" charset="0"/>
-            </a:endParaRPr>
-          </a:p>
-        </p:txBody>
-      </p:sp>
-      <p:sp>
-        <p:nvSpPr>
-          <p:cNvPr id="7" name="Content Placeholder 6"/>
-          <p:cNvSpPr>
-            <a:spLocks noGrp="1"/>
-          </p:cNvSpPr>
-          <p:nvPr>
-            <p:ph sz="half" idx="2"/>
-          </p:nvPr>
-        </p:nvSpPr>
-        <p:spPr>
-          <a:xfrm>
-            <a:off x="4644008" y="404663"/>
-            <a:ext cx="4038600" cy="2736305"/>
-          </a:xfrm>
-        </p:spPr>
-        <p:txBody>
-          <a:bodyPr>
-            <a:normAutofit/>
-          </a:bodyPr>
-          <a:lstStyle/>
+            <a:r>
+              <a:rPr lang="en-IN" sz="2800" dirty="0"/>
+              <a:t>Technological Platforms Used</a:t>
+            </a:r>
+          </a:p>
           <a:p>
             <a:pPr>
-              <a:buNone/>
+              <a:buFont typeface="Wingdings" pitchFamily="2" charset="2"/>
+              <a:buChar char="q"/>
             </a:pPr>
             <a:r>
-              <a:rPr lang="en-IN" sz="3200" b="1" dirty="0" smtClean="0"/>
-              <a:t>Project link:</a:t>
+              <a:rPr lang="en-IN" sz="2800" dirty="0"/>
+              <a:t>Languages Used</a:t>
             </a:r>
           </a:p>
           <a:p>
             <a:pPr>
-              <a:buNone/>
+              <a:buFont typeface="Wingdings" pitchFamily="2" charset="2"/>
+              <a:buChar char="q"/>
             </a:pPr>
             <a:r>
-              <a:rPr lang="en-IN" sz="1400" dirty="0" smtClean="0">
-                <a:hlinkClick r:id="rId2"/>
-              </a:rPr>
-              <a:t>https://gehu-scholarship.herokuapp.com/</a:t>
-            </a:r>
-            <a:endParaRPr lang="en-IN" sz="1400" dirty="0" smtClean="0"/>
+              <a:rPr lang="en-IN" sz="2800" dirty="0"/>
+              <a:t>Salient Features</a:t>
+            </a:r>
           </a:p>
           <a:p>
             <a:pPr>
-              <a:buNone/>
+              <a:buFont typeface="Wingdings" pitchFamily="2" charset="2"/>
+              <a:buChar char="q"/>
             </a:pPr>
-            <a:endParaRPr lang="en-IN" sz="1400" dirty="0" smtClean="0"/>
+            <a:r>
+              <a:rPr lang="en-IN" sz="2800" dirty="0"/>
+              <a:t>Application Snapshots</a:t>
+            </a:r>
           </a:p>
           <a:p>
             <a:pPr>
-              <a:buNone/>
+              <a:buFont typeface="Wingdings" pitchFamily="2" charset="2"/>
+              <a:buChar char="q"/>
             </a:pPr>
             <a:r>
-              <a:rPr lang="en-IN" sz="3200" b="1" dirty="0" smtClean="0"/>
-              <a:t>Github</a:t>
-            </a:r>
-            <a:r>
-              <a:rPr lang="en-IN" sz="3200" b="1" dirty="0" smtClean="0"/>
-              <a:t> link : </a:t>
+              <a:rPr lang="en-IN" sz="2800" dirty="0"/>
+              <a:t>Conclusion</a:t>
             </a:r>
           </a:p>
           <a:p>
             <a:pPr>
-              <a:buNone/>
+              <a:buFont typeface="Wingdings" pitchFamily="2" charset="2"/>
+              <a:buChar char="q"/>
             </a:pPr>
-            <a:r>
-              <a:rPr lang="en-IN" sz="1400" dirty="0" smtClean="0">
-                <a:hlinkClick r:id="rId3"/>
-              </a:rPr>
-              <a:t>https://github.com/tf153/Gehu-Scholarship/</a:t>
-            </a:r>
-            <a:endParaRPr lang="en-IN" sz="1400" dirty="0" smtClean="0"/>
-          </a:p>
-          <a:p>
-            <a:pPr>
-              <a:buNone/>
-            </a:pPr>
-            <a:endParaRPr lang="en-US" sz="1400" dirty="0"/>
-          </a:p>
-        </p:txBody>
-      </p:sp>
-      <p:graphicFrame>
-        <p:nvGraphicFramePr>
-          <p:cNvPr id="10" name="Table 9"/>
-          <p:cNvGraphicFramePr>
-            <a:graphicFrameLocks noGrp="1"/>
-          </p:cNvGraphicFramePr>
-          <p:nvPr/>
-        </p:nvGraphicFramePr>
-        <p:xfrm>
-          <a:off x="611560" y="4149080"/>
-          <a:ext cx="7992888" cy="1849120"/>
-        </p:xfrm>
-        <a:graphic>
-          <a:graphicData uri="http://schemas.openxmlformats.org/drawingml/2006/table">
-            <a:tbl>
-              <a:tblPr firstRow="1" bandRow="1">
-                <a:tableStyleId>{5C22544A-7EE6-4342-B048-85BDC9FD1C3A}</a:tableStyleId>
-              </a:tblPr>
-              <a:tblGrid>
-                <a:gridCol w="1440161"/>
-                <a:gridCol w="3600399"/>
-                <a:gridCol w="2952328"/>
-              </a:tblGrid>
-              <a:tr h="0">
-                <a:tc>
-                  <a:txBody>
-                    <a:bodyPr/>
-                    <a:lstStyle/>
-                    <a:p>
-                      <a:r>
-                        <a:rPr lang="en-IN" dirty="0" smtClean="0"/>
-                        <a:t>S.</a:t>
-                      </a:r>
-                      <a:r>
-                        <a:rPr lang="en-IN" baseline="0" dirty="0" smtClean="0"/>
-                        <a:t> No.</a:t>
-                      </a:r>
-                      <a:endParaRPr lang="en-US" dirty="0"/>
-                    </a:p>
-                  </a:txBody>
-                  <a:tcPr>
-                    <a:solidFill>
-                      <a:schemeClr val="bg1">
-                        <a:lumMod val="75000"/>
-                        <a:lumOff val="25000"/>
-                      </a:schemeClr>
-                    </a:solidFill>
-                  </a:tcPr>
-                </a:tc>
-                <a:tc>
-                  <a:txBody>
-                    <a:bodyPr/>
-                    <a:lstStyle/>
-                    <a:p>
-                      <a:r>
-                        <a:rPr lang="en-IN" dirty="0" smtClean="0"/>
-                        <a:t>Name </a:t>
-                      </a:r>
-                      <a:endParaRPr lang="en-US" dirty="0"/>
-                    </a:p>
-                  </a:txBody>
-                  <a:tcPr>
-                    <a:solidFill>
-                      <a:schemeClr val="bg1">
-                        <a:lumMod val="75000"/>
-                        <a:lumOff val="25000"/>
-                      </a:schemeClr>
-                    </a:solidFill>
-                  </a:tcPr>
-                </a:tc>
-                <a:tc>
-                  <a:txBody>
-                    <a:bodyPr/>
-                    <a:lstStyle/>
-                    <a:p>
-                      <a:r>
-                        <a:rPr lang="en-IN" dirty="0" smtClean="0"/>
-                        <a:t>University Roll number</a:t>
-                      </a:r>
-                      <a:endParaRPr lang="en-US" dirty="0"/>
-                    </a:p>
-                  </a:txBody>
-                  <a:tcPr>
-                    <a:solidFill>
-                      <a:schemeClr val="bg1">
-                        <a:lumMod val="75000"/>
-                        <a:lumOff val="25000"/>
-                      </a:schemeClr>
-                    </a:solidFill>
-                  </a:tcPr>
-                </a:tc>
-              </a:tr>
-              <a:tr h="370840">
-                <a:tc>
-                  <a:txBody>
-                    <a:bodyPr/>
-                    <a:lstStyle/>
-                    <a:p>
-                      <a:r>
-                        <a:rPr lang="en-IN" dirty="0" smtClean="0"/>
-                        <a:t>1</a:t>
-                      </a:r>
-                      <a:endParaRPr lang="en-US" dirty="0"/>
-                    </a:p>
-                  </a:txBody>
-                  <a:tcPr>
-                    <a:solidFill>
-                      <a:schemeClr val="tx1">
-                        <a:lumMod val="65000"/>
-                      </a:schemeClr>
-                    </a:solidFill>
-                  </a:tcPr>
-                </a:tc>
-                <a:tc>
-                  <a:txBody>
-                    <a:bodyPr/>
-                    <a:lstStyle/>
-                    <a:p>
-                      <a:r>
-                        <a:rPr lang="en-IN" dirty="0" smtClean="0"/>
-                        <a:t>Priyanka Joshi</a:t>
-                      </a:r>
-                      <a:endParaRPr lang="en-US" dirty="0"/>
-                    </a:p>
-                  </a:txBody>
-                  <a:tcPr>
-                    <a:solidFill>
-                      <a:schemeClr val="tx1">
-                        <a:lumMod val="65000"/>
-                      </a:schemeClr>
-                    </a:solidFill>
-                  </a:tcPr>
-                </a:tc>
-                <a:tc>
-                  <a:txBody>
-                    <a:bodyPr/>
-                    <a:lstStyle/>
-                    <a:p>
-                      <a:r>
-                        <a:rPr lang="en-IN" dirty="0" smtClean="0"/>
-                        <a:t>2062394</a:t>
-                      </a:r>
-                      <a:endParaRPr lang="en-US" dirty="0"/>
-                    </a:p>
-                  </a:txBody>
-                  <a:tcPr>
-                    <a:solidFill>
-                      <a:schemeClr val="tx1">
-                        <a:lumMod val="65000"/>
-                      </a:schemeClr>
-                    </a:solidFill>
-                  </a:tcPr>
-                </a:tc>
-              </a:tr>
-              <a:tr h="370840">
-                <a:tc>
-                  <a:txBody>
-                    <a:bodyPr/>
-                    <a:lstStyle/>
-                    <a:p>
-                      <a:r>
-                        <a:rPr lang="en-IN" dirty="0" smtClean="0"/>
-                        <a:t>2</a:t>
-                      </a:r>
-                      <a:endParaRPr lang="en-US" dirty="0"/>
-                    </a:p>
-                  </a:txBody>
-                  <a:tcPr>
-                    <a:solidFill>
-                      <a:schemeClr val="tx1">
-                        <a:lumMod val="65000"/>
-                      </a:schemeClr>
-                    </a:solidFill>
-                  </a:tcPr>
-                </a:tc>
-                <a:tc>
-                  <a:txBody>
-                    <a:bodyPr/>
-                    <a:lstStyle/>
-                    <a:p>
-                      <a:r>
-                        <a:rPr lang="en-IN" dirty="0" smtClean="0"/>
-                        <a:t>Rahul</a:t>
-                      </a:r>
-                      <a:r>
-                        <a:rPr lang="en-IN" baseline="0" dirty="0" smtClean="0"/>
-                        <a:t> Joshi</a:t>
-                      </a:r>
-                      <a:endParaRPr lang="en-US" dirty="0"/>
-                    </a:p>
-                  </a:txBody>
-                  <a:tcPr>
-                    <a:solidFill>
-                      <a:schemeClr val="tx1">
-                        <a:lumMod val="65000"/>
-                      </a:schemeClr>
-                    </a:solidFill>
-                  </a:tcPr>
-                </a:tc>
-                <a:tc>
-                  <a:txBody>
-                    <a:bodyPr/>
-                    <a:lstStyle/>
-                    <a:p>
-                      <a:r>
-                        <a:rPr lang="en-IN" dirty="0" smtClean="0"/>
-                        <a:t>2061711</a:t>
-                      </a:r>
-                      <a:endParaRPr lang="en-US" dirty="0"/>
-                    </a:p>
-                  </a:txBody>
-                  <a:tcPr>
-                    <a:solidFill>
-                      <a:schemeClr val="tx1">
-                        <a:lumMod val="65000"/>
-                      </a:schemeClr>
-                    </a:solidFill>
-                  </a:tcPr>
-                </a:tc>
-              </a:tr>
-              <a:tr h="370840">
-                <a:tc>
-                  <a:txBody>
-                    <a:bodyPr/>
-                    <a:lstStyle/>
-                    <a:p>
-                      <a:r>
-                        <a:rPr lang="en-IN" dirty="0" smtClean="0"/>
-                        <a:t>3</a:t>
-                      </a:r>
-                      <a:endParaRPr lang="en-US" dirty="0"/>
-                    </a:p>
-                  </a:txBody>
-                  <a:tcPr>
-                    <a:solidFill>
-                      <a:schemeClr val="tx1">
-                        <a:lumMod val="65000"/>
-                      </a:schemeClr>
-                    </a:solidFill>
-                  </a:tcPr>
-                </a:tc>
-                <a:tc>
-                  <a:txBody>
-                    <a:bodyPr/>
-                    <a:lstStyle/>
-                    <a:p>
-                      <a:r>
-                        <a:rPr lang="en-IN" dirty="0" smtClean="0"/>
-                        <a:t>Rahul</a:t>
-                      </a:r>
-                      <a:r>
-                        <a:rPr lang="en-IN" baseline="0" dirty="0" smtClean="0"/>
-                        <a:t> Mehta</a:t>
-                      </a:r>
-                      <a:endParaRPr lang="en-US" dirty="0"/>
-                    </a:p>
-                  </a:txBody>
-                  <a:tcPr>
-                    <a:solidFill>
-                      <a:schemeClr val="tx1">
-                        <a:lumMod val="65000"/>
-                      </a:schemeClr>
-                    </a:solidFill>
-                  </a:tcPr>
-                </a:tc>
-                <a:tc>
-                  <a:txBody>
-                    <a:bodyPr/>
-                    <a:lstStyle/>
-                    <a:p>
-                      <a:r>
-                        <a:rPr lang="en-IN" dirty="0" smtClean="0"/>
-                        <a:t>2061712</a:t>
-                      </a:r>
-                      <a:endParaRPr lang="en-US" dirty="0"/>
-                    </a:p>
-                  </a:txBody>
-                  <a:tcPr>
-                    <a:solidFill>
-                      <a:schemeClr val="tx1">
-                        <a:lumMod val="65000"/>
-                      </a:schemeClr>
-                    </a:solidFill>
-                  </a:tcPr>
-                </a:tc>
-              </a:tr>
-              <a:tr h="370840">
-                <a:tc>
-                  <a:txBody>
-                    <a:bodyPr/>
-                    <a:lstStyle/>
-                    <a:p>
-                      <a:r>
-                        <a:rPr lang="en-IN" dirty="0" smtClean="0"/>
-                        <a:t>4</a:t>
-                      </a:r>
-                      <a:endParaRPr lang="en-US" dirty="0"/>
-                    </a:p>
-                  </a:txBody>
-                  <a:tcPr>
-                    <a:solidFill>
-                      <a:schemeClr val="tx1">
-                        <a:lumMod val="65000"/>
-                      </a:schemeClr>
-                    </a:solidFill>
-                  </a:tcPr>
-                </a:tc>
-                <a:tc>
-                  <a:txBody>
-                    <a:bodyPr/>
-                    <a:lstStyle/>
-                    <a:p>
-                      <a:r>
-                        <a:rPr lang="en-IN" dirty="0" smtClean="0"/>
-                        <a:t>Rashmi Satwal</a:t>
-                      </a:r>
-                      <a:endParaRPr lang="en-US" dirty="0"/>
-                    </a:p>
-                  </a:txBody>
-                  <a:tcPr>
-                    <a:solidFill>
-                      <a:schemeClr val="tx1">
-                        <a:lumMod val="65000"/>
-                      </a:schemeClr>
-                    </a:solidFill>
-                  </a:tcPr>
-                </a:tc>
-                <a:tc>
-                  <a:txBody>
-                    <a:bodyPr/>
-                    <a:lstStyle/>
-                    <a:p>
-                      <a:r>
-                        <a:rPr lang="en-IN" dirty="0" smtClean="0"/>
-                        <a:t>2061713</a:t>
-                      </a:r>
-                      <a:endParaRPr lang="en-US" dirty="0"/>
-                    </a:p>
-                  </a:txBody>
-                  <a:tcPr>
-                    <a:solidFill>
-                      <a:schemeClr val="tx1">
-                        <a:lumMod val="65000"/>
-                      </a:schemeClr>
-                    </a:solidFill>
-                  </a:tcPr>
-                </a:tc>
-              </a:tr>
-            </a:tbl>
-          </a:graphicData>
-        </a:graphic>
-      </p:graphicFrame>
+            <a:endParaRPr lang="en-US" sz="2800" dirty="0"/>
+          </a:p>
+        </p:txBody>
+      </p:sp>
     </p:spTree>
   </p:cSld>
   <p:clrMapOvr>
     <a:masterClrMapping/>
   </p:clrMapOvr>
-  <p:timing>
-    <p:tnLst>
-      <p:par>
-        <p:cTn id="1" dur="indefinite" restart="never" nodeType="tmRoot"/>
-      </p:par>
-    </p:tnLst>
-  </p:timing>
 </p:sld>
 </file>
 
@@ -4945,7 +4532,7 @@
       </p:grpSpPr>
       <p:sp>
         <p:nvSpPr>
-          <p:cNvPr id="2" name="Title 1"/>
+          <p:cNvPr id="4" name="Title 3"/>
           <p:cNvSpPr>
             <a:spLocks noGrp="1"/>
           </p:cNvSpPr>
@@ -4953,41 +4540,30 @@
             <p:ph type="title"/>
           </p:nvPr>
         </p:nvSpPr>
-        <p:spPr>
-          <a:xfrm>
-            <a:off x="0" y="836712"/>
-            <a:ext cx="8686800" cy="1399032"/>
-          </a:xfrm>
-        </p:spPr>
+        <p:spPr/>
         <p:txBody>
           <a:bodyPr>
-            <a:noAutofit/>
+            <a:normAutofit/>
           </a:bodyPr>
           <a:lstStyle/>
           <a:p>
-            <a:pPr algn="ctr"/>
-            <a:r>
-              <a:rPr lang="en-US" sz="4800" b="1" dirty="0" smtClean="0"/>
-              <a:t>Presentation Outline</a:t>
-            </a:r>
-            <a:r>
-              <a:rPr lang="en-US" sz="4800" dirty="0" smtClean="0"/>
-              <a:t/>
-            </a:r>
-            <a:br>
-              <a:rPr lang="en-US" sz="4800" dirty="0" smtClean="0"/>
-            </a:br>
-            <a:endParaRPr lang="en-US" sz="4800" b="1" dirty="0">
-              <a:solidFill>
-                <a:schemeClr val="tx1"/>
-              </a:solidFill>
+            <a:r>
+              <a:rPr lang="en-IN" sz="5400" b="1" dirty="0">
+                <a:latin typeface="Arial" pitchFamily="34" charset="0"/>
+                <a:cs typeface="Arial" pitchFamily="34" charset="0"/>
+              </a:rPr>
+              <a:t>Objectives</a:t>
+            </a:r>
+            <a:endParaRPr lang="en-US" sz="5400" b="1" dirty="0">
+              <a:latin typeface="Arial" pitchFamily="34" charset="0"/>
+              <a:cs typeface="Arial" pitchFamily="34" charset="0"/>
             </a:endParaRPr>
           </a:p>
         </p:txBody>
       </p:sp>
       <p:sp>
         <p:nvSpPr>
-          <p:cNvPr id="3" name="Content Placeholder 2"/>
+          <p:cNvPr id="5" name="Content Placeholder 4"/>
           <p:cNvSpPr>
             <a:spLocks noGrp="1"/>
           </p:cNvSpPr>
@@ -4995,15 +4571,10 @@
             <p:ph idx="1"/>
           </p:nvPr>
         </p:nvSpPr>
-        <p:spPr>
-          <a:xfrm>
-            <a:off x="457200" y="2348880"/>
-            <a:ext cx="8229600" cy="4105928"/>
-          </a:xfrm>
-        </p:spPr>
+        <p:spPr/>
         <p:txBody>
           <a:bodyPr>
-            <a:normAutofit fontScale="92500" lnSpcReduction="10000"/>
+            <a:normAutofit/>
           </a:bodyPr>
           <a:lstStyle/>
           <a:p>
@@ -5012,96 +4583,15 @@
               <a:buChar char="q"/>
             </a:pPr>
             <a:r>
-              <a:rPr lang="en-IN" sz="2800" dirty="0" smtClean="0"/>
-              <a:t>Introduction</a:t>
-            </a:r>
-          </a:p>
-          <a:p>
-            <a:pPr>
-              <a:buFont typeface="Wingdings" pitchFamily="2" charset="2"/>
-              <a:buChar char="q"/>
-            </a:pPr>
-            <a:r>
-              <a:rPr lang="en-IN" sz="2800" dirty="0" smtClean="0"/>
-              <a:t>Objectives</a:t>
-            </a:r>
-          </a:p>
-          <a:p>
-            <a:pPr>
-              <a:buFont typeface="Wingdings" pitchFamily="2" charset="2"/>
-              <a:buChar char="q"/>
-            </a:pPr>
-            <a:r>
-              <a:rPr lang="en-IN" sz="2800" dirty="0" smtClean="0"/>
-              <a:t>Academic Objectives</a:t>
-            </a:r>
-          </a:p>
-          <a:p>
-            <a:pPr>
-              <a:buFont typeface="Wingdings" pitchFamily="2" charset="2"/>
-              <a:buChar char="q"/>
-            </a:pPr>
-            <a:r>
-              <a:rPr lang="en-IN" sz="2800" dirty="0" smtClean="0"/>
-              <a:t>Uses</a:t>
-            </a:r>
-          </a:p>
-          <a:p>
-            <a:pPr>
-              <a:buFont typeface="Wingdings" pitchFamily="2" charset="2"/>
-              <a:buChar char="q"/>
-            </a:pPr>
-            <a:r>
-              <a:rPr lang="en-IN" sz="2800" dirty="0" smtClean="0"/>
-              <a:t>Technological Platforms Used</a:t>
-            </a:r>
-          </a:p>
-          <a:p>
-            <a:pPr>
-              <a:buFont typeface="Wingdings" pitchFamily="2" charset="2"/>
-              <a:buChar char="q"/>
-            </a:pPr>
-            <a:r>
-              <a:rPr lang="en-IN" sz="2800" dirty="0" smtClean="0"/>
-              <a:t>Languages Used</a:t>
-            </a:r>
-          </a:p>
-          <a:p>
-            <a:pPr>
-              <a:buFont typeface="Wingdings" pitchFamily="2" charset="2"/>
-              <a:buChar char="q"/>
-            </a:pPr>
-            <a:r>
-              <a:rPr lang="en-IN" sz="2800" dirty="0" smtClean="0"/>
-              <a:t>Salient Features</a:t>
-            </a:r>
-          </a:p>
-          <a:p>
-            <a:pPr>
-              <a:buFont typeface="Wingdings" pitchFamily="2" charset="2"/>
-              <a:buChar char="q"/>
-            </a:pPr>
-            <a:r>
-              <a:rPr lang="en-IN" sz="2800" dirty="0" smtClean="0"/>
-              <a:t>Application Snapshots</a:t>
-            </a:r>
-          </a:p>
-          <a:p>
-            <a:pPr>
-              <a:buFont typeface="Wingdings" pitchFamily="2" charset="2"/>
-              <a:buChar char="q"/>
-            </a:pPr>
-            <a:r>
-              <a:rPr lang="en-IN" sz="2800" dirty="0" smtClean="0"/>
-              <a:t>Conclusion</a:t>
-            </a:r>
-          </a:p>
-          <a:p>
-            <a:pPr>
-              <a:buFont typeface="Wingdings" pitchFamily="2" charset="2"/>
-              <a:buChar char="q"/>
-            </a:pPr>
-            <a:endParaRPr lang="en-US" sz="2800" dirty="0" smtClean="0"/>
+              <a:rPr lang="en-US" sz="2800" dirty="0">
+                <a:effectLst/>
+                <a:latin typeface="Calibri" panose="020F0502020204030204" pitchFamily="34" charset="0"/>
+                <a:ea typeface="Times New Roman" panose="02020603050405020304" pitchFamily="18" charset="0"/>
+                <a:cs typeface="Mangal" panose="02040503050203030202" pitchFamily="18" charset="0"/>
+              </a:rPr>
+              <a:t>The purpose of the chat application is to allow users be able to the chat with each other, like a normal chat application. The users will be able to chat with each other, most likely only from user to user, no group chatting will be developed, unless there is time to do so</a:t>
+            </a:r>
+            <a:endParaRPr lang="en-IN" sz="4000" dirty="0"/>
           </a:p>
         </p:txBody>
       </p:sp>
@@ -5110,13 +4600,6 @@
   <p:clrMapOvr>
     <a:masterClrMapping/>
   </p:clrMapOvr>
-  <p:timing>
-    <p:tnLst>
-      <p:par>
-        <p:cTn id="1" dur="indefinite" restart="never" nodeType="tmRoot"/>
-      </p:par>
-    </p:tnLst>
-  </p:timing>
 </p:sld>
 </file>
 
@@ -5147,50 +4630,43 @@
             <p:ph type="title"/>
           </p:nvPr>
         </p:nvSpPr>
-        <p:spPr>
-          <a:xfrm>
-            <a:off x="0" y="267494"/>
-            <a:ext cx="8686800" cy="1399032"/>
-          </a:xfrm>
-        </p:spPr>
+        <p:spPr/>
+        <p:txBody>
+          <a:bodyPr/>
+          <a:lstStyle/>
+          <a:p>
+            <a:r>
+              <a:rPr lang="en-IN" dirty="0"/>
+              <a:t>Academic Objectives</a:t>
+            </a:r>
+            <a:endParaRPr lang="en-US" dirty="0"/>
+          </a:p>
+        </p:txBody>
+      </p:sp>
+      <p:sp>
+        <p:nvSpPr>
+          <p:cNvPr id="3" name="Content Placeholder 2"/>
+          <p:cNvSpPr>
+            <a:spLocks noGrp="1"/>
+          </p:cNvSpPr>
+          <p:nvPr>
+            <p:ph idx="1"/>
+          </p:nvPr>
+        </p:nvSpPr>
+        <p:spPr/>
         <p:txBody>
           <a:bodyPr>
             <a:normAutofit/>
           </a:bodyPr>
           <a:lstStyle/>
           <a:p>
-            <a:r>
-              <a:rPr lang="en-IN" sz="6000" b="1" dirty="0" smtClean="0"/>
-              <a:t>Introduction</a:t>
-            </a:r>
-            <a:endParaRPr lang="en-US" sz="6000" b="1" dirty="0" smtClean="0"/>
-          </a:p>
-        </p:txBody>
-      </p:sp>
-      <p:sp>
-        <p:nvSpPr>
-          <p:cNvPr id="5" name="Content Placeholder 4"/>
-          <p:cNvSpPr>
-            <a:spLocks noGrp="1"/>
-          </p:cNvSpPr>
-          <p:nvPr>
-            <p:ph idx="1"/>
-          </p:nvPr>
-        </p:nvSpPr>
-        <p:spPr/>
-        <p:txBody>
-          <a:bodyPr>
-            <a:normAutofit fontScale="85000" lnSpcReduction="20000"/>
-          </a:bodyPr>
-          <a:lstStyle/>
-          <a:p>
             <a:pPr>
               <a:buFont typeface="Wingdings" pitchFamily="2" charset="2"/>
               <a:buChar char="q"/>
             </a:pPr>
             <a:r>
-              <a:rPr lang="en-IN" dirty="0" smtClean="0"/>
-              <a:t>Online Scholarship calculator website is a convenient and an efficient way of getting accurate information about the scholarship and hence, the fee structure of the respective Graphic Era University.</a:t>
+              <a:rPr lang="en-IN" sz="2400" dirty="0"/>
+              <a:t>Learn the process of the implementation of android development.</a:t>
             </a:r>
           </a:p>
           <a:p>
@@ -5199,8 +4675,8 @@
               <a:buChar char="q"/>
             </a:pPr>
             <a:r>
-              <a:rPr lang="en-IN" dirty="0" smtClean="0"/>
-              <a:t>Web development has become increasingly powerful in the recent years. </a:t>
+              <a:rPr lang="en-IN" sz="2400" dirty="0"/>
+              <a:t>Understanding the working and application of Firebase.</a:t>
             </a:r>
           </a:p>
           <a:p>
@@ -5209,8 +4685,8 @@
               <a:buChar char="q"/>
             </a:pPr>
             <a:r>
-              <a:rPr lang="en-IN" dirty="0" smtClean="0"/>
-              <a:t>Our project motivation is to convert manual and computational problems into an easy online accurate solution.</a:t>
+              <a:rPr lang="en-IN" sz="2400" dirty="0"/>
+              <a:t>Designing and developing activities. </a:t>
             </a:r>
           </a:p>
           <a:p>
@@ -5219,10 +4695,20 @@
               <a:buChar char="q"/>
             </a:pPr>
             <a:r>
-              <a:rPr lang="en-IN" dirty="0" smtClean="0"/>
-              <a:t>By using this website, anyone can get required information at anytime and anywhere at the ease of just of search away. </a:t>
-            </a:r>
-            <a:endParaRPr lang="en-US" dirty="0"/>
+              <a:rPr lang="en-IN" sz="2400" dirty="0"/>
+              <a:t>Utilizing the minimum resources while working online within a given period of time.</a:t>
+            </a:r>
+          </a:p>
+          <a:p>
+            <a:pPr>
+              <a:buFont typeface="Wingdings" pitchFamily="2" charset="2"/>
+              <a:buChar char="q"/>
+            </a:pPr>
+            <a:r>
+              <a:rPr lang="en-IN" sz="2400" dirty="0"/>
+              <a:t>Finally, developing an app which can be accessed by everyone for free.</a:t>
+            </a:r>
+            <a:endParaRPr lang="en-US" sz="2400" dirty="0"/>
           </a:p>
         </p:txBody>
       </p:sp>
@@ -5231,13 +4717,6 @@
   <p:clrMapOvr>
     <a:masterClrMapping/>
   </p:clrMapOvr>
-  <p:timing>
-    <p:tnLst>
-      <p:par>
-        <p:cTn id="1" dur="indefinite" restart="never" nodeType="tmRoot"/>
-      </p:par>
-    </p:tnLst>
-  </p:timing>
 </p:sld>
 </file>
 
@@ -5260,7 +4739,7 @@
       </p:grpSpPr>
       <p:sp>
         <p:nvSpPr>
-          <p:cNvPr id="4" name="Title 3"/>
+          <p:cNvPr id="2" name="Title 1"/>
           <p:cNvSpPr>
             <a:spLocks noGrp="1"/>
           </p:cNvSpPr>
@@ -5268,70 +4747,61 @@
             <p:ph type="title"/>
           </p:nvPr>
         </p:nvSpPr>
-        <p:spPr/>
+        <p:spPr>
+          <a:xfrm>
+            <a:off x="0" y="267494"/>
+            <a:ext cx="9144000" cy="1145282"/>
+          </a:xfrm>
+        </p:spPr>
+        <p:txBody>
+          <a:bodyPr>
+            <a:noAutofit/>
+          </a:bodyPr>
+          <a:lstStyle/>
+          <a:p>
+            <a:r>
+              <a:rPr lang="en-IN" sz="6000" b="1" dirty="0"/>
+              <a:t>Uses</a:t>
+            </a:r>
+            <a:endParaRPr lang="en-US" sz="6000" b="1" dirty="0"/>
+          </a:p>
+        </p:txBody>
+      </p:sp>
+      <p:sp>
+        <p:nvSpPr>
+          <p:cNvPr id="5" name="Content Placeholder 4"/>
+          <p:cNvSpPr>
+            <a:spLocks noGrp="1"/>
+          </p:cNvSpPr>
+          <p:nvPr>
+            <p:ph idx="1"/>
+          </p:nvPr>
+        </p:nvSpPr>
+        <p:spPr>
+          <a:xfrm>
+            <a:off x="457200" y="1556792"/>
+            <a:ext cx="8229600" cy="4898016"/>
+          </a:xfrm>
+        </p:spPr>
         <p:txBody>
           <a:bodyPr>
             <a:normAutofit/>
           </a:bodyPr>
           <a:lstStyle/>
           <a:p>
-            <a:r>
-              <a:rPr lang="en-IN" sz="5400" b="1" dirty="0" smtClean="0">
-                <a:latin typeface="Arial" pitchFamily="34" charset="0"/>
-                <a:cs typeface="Arial" pitchFamily="34" charset="0"/>
+            <a:pPr marL="64008" indent="0">
+              <a:buNone/>
+            </a:pPr>
+            <a:r>
+              <a:rPr lang="en-US" sz="2800" dirty="0">
+                <a:effectLst/>
+                <a:latin typeface="Calibri" panose="020F0502020204030204" pitchFamily="34" charset="0"/>
+                <a:ea typeface="Times New Roman" panose="02020603050405020304" pitchFamily="18" charset="0"/>
+                <a:cs typeface="Mangal" panose="02040503050203030202" pitchFamily="18" charset="0"/>
               </a:rPr>
-              <a:t>Objectives</a:t>
-            </a:r>
-            <a:endParaRPr lang="en-US" sz="5400" b="1" dirty="0">
-              <a:latin typeface="Arial" pitchFamily="34" charset="0"/>
-              <a:cs typeface="Arial" pitchFamily="34" charset="0"/>
-            </a:endParaRPr>
-          </a:p>
-        </p:txBody>
-      </p:sp>
-      <p:sp>
-        <p:nvSpPr>
-          <p:cNvPr id="5" name="Content Placeholder 4"/>
-          <p:cNvSpPr>
-            <a:spLocks noGrp="1"/>
-          </p:cNvSpPr>
-          <p:nvPr>
-            <p:ph idx="1"/>
-          </p:nvPr>
-        </p:nvSpPr>
-        <p:spPr/>
-        <p:txBody>
-          <a:bodyPr/>
-          <a:lstStyle/>
-          <a:p>
-            <a:pPr>
-              <a:buFont typeface="Wingdings" pitchFamily="2" charset="2"/>
-              <a:buChar char="q"/>
-            </a:pPr>
-            <a:r>
-              <a:rPr lang="en-IN" dirty="0" smtClean="0"/>
-              <a:t>To provide the accurate and instant information about the scholarship and fee structure according to the respective campuses.</a:t>
-            </a:r>
-          </a:p>
-          <a:p>
-            <a:pPr>
-              <a:buFont typeface="Wingdings" pitchFamily="2" charset="2"/>
-              <a:buChar char="q"/>
-            </a:pPr>
-            <a:r>
-              <a:rPr lang="en-IN" dirty="0" smtClean="0"/>
-              <a:t> To avoid confusion among the students regarding the fee structure.</a:t>
-            </a:r>
-          </a:p>
-          <a:p>
-            <a:pPr>
-              <a:buFont typeface="Wingdings" pitchFamily="2" charset="2"/>
-              <a:buChar char="q"/>
-            </a:pPr>
-            <a:r>
-              <a:rPr lang="en-IN" dirty="0" smtClean="0"/>
-              <a:t>To filter out the eligible students according to the terms and conditions for the scholarship criteria.</a:t>
-            </a:r>
+              <a:t>The purpose of the chat application is to allow users be able to the chat with each other, like a normal chat application. The users will be able to chat with each other, most likely only from user to user, no group chatting will be developed, unless there is time to do so</a:t>
+            </a:r>
+            <a:endParaRPr lang="en-US" sz="3600" dirty="0"/>
           </a:p>
         </p:txBody>
       </p:sp>
@@ -5340,13 +4810,6 @@
   <p:clrMapOvr>
     <a:masterClrMapping/>
   </p:clrMapOvr>
-  <p:timing>
-    <p:tnLst>
-      <p:par>
-        <p:cTn id="1" dur="indefinite" restart="never" nodeType="tmRoot"/>
-      </p:par>
-    </p:tnLst>
-  </p:timing>
 </p:sld>
 </file>
 
@@ -5374,98 +4837,216 @@
             <a:spLocks noGrp="1"/>
           </p:cNvSpPr>
           <p:nvPr>
-            <p:ph type="title"/>
-          </p:nvPr>
-        </p:nvSpPr>
-        <p:spPr/>
-        <p:txBody>
-          <a:bodyPr/>
-          <a:lstStyle/>
-          <a:p>
-            <a:r>
-              <a:rPr lang="en-IN" dirty="0" smtClean="0"/>
-              <a:t>Academic Objectives</a:t>
-            </a:r>
-            <a:endParaRPr lang="en-US" dirty="0"/>
-          </a:p>
-        </p:txBody>
-      </p:sp>
-      <p:sp>
-        <p:nvSpPr>
-          <p:cNvPr id="3" name="Content Placeholder 2"/>
-          <p:cNvSpPr>
-            <a:spLocks noGrp="1"/>
-          </p:cNvSpPr>
-          <p:nvPr>
-            <p:ph idx="1"/>
-          </p:nvPr>
-        </p:nvSpPr>
-        <p:spPr/>
+            <p:ph type="title" idx="4294967295"/>
+          </p:nvPr>
+        </p:nvSpPr>
+        <p:spPr>
+          <a:xfrm>
+            <a:off x="0" y="268288"/>
+            <a:ext cx="8686800" cy="1398587"/>
+          </a:xfrm>
+        </p:spPr>
         <p:txBody>
           <a:bodyPr>
-            <a:normAutofit/>
+            <a:noAutofit/>
           </a:bodyPr>
           <a:lstStyle/>
           <a:p>
-            <a:pPr>
-              <a:buFont typeface="Wingdings" pitchFamily="2" charset="2"/>
-              <a:buChar char="q"/>
+            <a:r>
+              <a:rPr lang="en-IN" sz="5400" b="1" dirty="0">
+                <a:solidFill>
+                  <a:schemeClr val="tx1"/>
+                </a:solidFill>
+              </a:rPr>
+              <a:t>Technological Platforms Used</a:t>
+            </a:r>
+            <a:endParaRPr lang="en-US" sz="5400" b="1" dirty="0">
+              <a:solidFill>
+                <a:schemeClr val="tx1"/>
+              </a:solidFill>
+            </a:endParaRPr>
+          </a:p>
+        </p:txBody>
+      </p:sp>
+      <p:sp>
+        <p:nvSpPr>
+          <p:cNvPr id="3" name="Content Placeholder 2"/>
+          <p:cNvSpPr>
+            <a:spLocks noGrp="1"/>
+          </p:cNvSpPr>
+          <p:nvPr>
+            <p:ph idx="4294967295"/>
+          </p:nvPr>
+        </p:nvSpPr>
+        <p:spPr>
+          <a:xfrm>
+            <a:off x="0" y="2348879"/>
+            <a:ext cx="8686800" cy="4105895"/>
+          </a:xfrm>
+        </p:spPr>
+        <p:txBody>
+          <a:bodyPr>
+            <a:normAutofit lnSpcReduction="10000"/>
+          </a:bodyPr>
+          <a:lstStyle/>
+          <a:p>
+            <a:pPr marL="342900" lvl="0" indent="-342900">
+              <a:lnSpc>
+                <a:spcPct val="200000"/>
+              </a:lnSpc>
+              <a:spcAft>
+                <a:spcPts val="1000"/>
+              </a:spcAft>
+              <a:buFont typeface="Wingdings" panose="05000000000000000000" pitchFamily="2" charset="2"/>
+              <a:buChar char=""/>
+              <a:tabLst>
+                <a:tab pos="457200" algn="l"/>
+              </a:tabLst>
             </a:pPr>
             <a:r>
-              <a:rPr lang="en-IN" sz="2400" dirty="0" smtClean="0"/>
-              <a:t>Learn the process of the implementation of various programming languages used in Web Technology.</a:t>
-            </a:r>
-          </a:p>
-          <a:p>
-            <a:pPr>
-              <a:buFont typeface="Wingdings" pitchFamily="2" charset="2"/>
-              <a:buChar char="q"/>
+              <a:rPr lang="en-IN" sz="2400" b="1" dirty="0">
+                <a:effectLst/>
+                <a:latin typeface="Times New Roman" panose="02020603050405020304" pitchFamily="18" charset="0"/>
+                <a:ea typeface="Times New Roman" panose="02020603050405020304" pitchFamily="18" charset="0"/>
+                <a:cs typeface="Mangal" panose="02040503050203030202" pitchFamily="18" charset="0"/>
+              </a:rPr>
+              <a:t>Git Hub </a:t>
+            </a:r>
+            <a:r>
+              <a:rPr lang="en-IN" sz="2400" dirty="0">
+                <a:effectLst/>
+                <a:latin typeface="Times New Roman" panose="02020603050405020304" pitchFamily="18" charset="0"/>
+                <a:ea typeface="Times New Roman" panose="02020603050405020304" pitchFamily="18" charset="0"/>
+                <a:cs typeface="Mangal" panose="02040503050203030202" pitchFamily="18" charset="0"/>
+              </a:rPr>
+              <a:t>: for doing and keeping a record of the work.</a:t>
+            </a:r>
+            <a:r>
+              <a:rPr lang="en-IN" sz="2400" dirty="0">
+                <a:effectLst/>
+                <a:latin typeface="Calibri" panose="020F0502020204030204" pitchFamily="34" charset="0"/>
+                <a:ea typeface="Times New Roman" panose="02020603050405020304" pitchFamily="18" charset="0"/>
+                <a:cs typeface="Mangal" panose="02040503050203030202" pitchFamily="18" charset="0"/>
+              </a:rPr>
+              <a:t> </a:t>
+            </a:r>
+          </a:p>
+          <a:p>
+            <a:pPr marL="342900" lvl="0" indent="-342900">
+              <a:lnSpc>
+                <a:spcPct val="200000"/>
+              </a:lnSpc>
+              <a:spcAft>
+                <a:spcPts val="1000"/>
+              </a:spcAft>
+              <a:buFont typeface="Wingdings" panose="05000000000000000000" pitchFamily="2" charset="2"/>
+              <a:buChar char=""/>
+              <a:tabLst>
+                <a:tab pos="457200" algn="l"/>
+              </a:tabLst>
             </a:pPr>
             <a:r>
-              <a:rPr lang="en-IN" sz="2400" dirty="0" smtClean="0"/>
-              <a:t>Understanding the working and application of Web Development.</a:t>
-            </a:r>
-          </a:p>
-          <a:p>
-            <a:pPr>
-              <a:buFont typeface="Wingdings" pitchFamily="2" charset="2"/>
-              <a:buChar char="q"/>
+              <a:rPr lang="en-IN" sz="2400" b="1" dirty="0">
+                <a:effectLst/>
+                <a:latin typeface="Times New Roman" panose="02020603050405020304" pitchFamily="18" charset="0"/>
+                <a:ea typeface="Times New Roman" panose="02020603050405020304" pitchFamily="18" charset="0"/>
+                <a:cs typeface="Mangal" panose="02040503050203030202" pitchFamily="18" charset="0"/>
+              </a:rPr>
+              <a:t>Android Studio</a:t>
+            </a:r>
+            <a:r>
+              <a:rPr lang="en-IN" sz="2400" dirty="0">
+                <a:effectLst/>
+                <a:latin typeface="Times New Roman" panose="02020603050405020304" pitchFamily="18" charset="0"/>
+                <a:ea typeface="Times New Roman" panose="02020603050405020304" pitchFamily="18" charset="0"/>
+                <a:cs typeface="Mangal" panose="02040503050203030202" pitchFamily="18" charset="0"/>
+              </a:rPr>
+              <a:t> : editor for android development.</a:t>
+            </a:r>
+            <a:endParaRPr lang="en-IN" sz="2400" dirty="0">
+              <a:effectLst/>
+              <a:latin typeface="Calibri" panose="020F0502020204030204" pitchFamily="34" charset="0"/>
+              <a:ea typeface="Times New Roman" panose="02020603050405020304" pitchFamily="18" charset="0"/>
+              <a:cs typeface="Mangal" panose="02040503050203030202" pitchFamily="18" charset="0"/>
+            </a:endParaRPr>
+          </a:p>
+          <a:p>
+            <a:pPr marL="342900" lvl="0" indent="-342900">
+              <a:lnSpc>
+                <a:spcPct val="200000"/>
+              </a:lnSpc>
+              <a:spcAft>
+                <a:spcPts val="1000"/>
+              </a:spcAft>
+              <a:buFont typeface="Wingdings" panose="05000000000000000000" pitchFamily="2" charset="2"/>
+              <a:buChar char=""/>
+              <a:tabLst>
+                <a:tab pos="457200" algn="l"/>
+              </a:tabLst>
             </a:pPr>
             <a:r>
-              <a:rPr lang="en-IN" sz="2400" dirty="0" smtClean="0"/>
-              <a:t>Designing and developing web pages.</a:t>
-            </a:r>
-          </a:p>
-          <a:p>
-            <a:pPr>
-              <a:buFont typeface="Wingdings" pitchFamily="2" charset="2"/>
-              <a:buChar char="q"/>
+              <a:rPr lang="en-IN" sz="2400" b="1" dirty="0">
+                <a:effectLst/>
+                <a:latin typeface="Times New Roman" panose="02020603050405020304" pitchFamily="18" charset="0"/>
+                <a:ea typeface="Times New Roman" panose="02020603050405020304" pitchFamily="18" charset="0"/>
+                <a:cs typeface="Mangal" panose="02040503050203030202" pitchFamily="18" charset="0"/>
+              </a:rPr>
+              <a:t>Android Emulator</a:t>
+            </a:r>
+            <a:r>
+              <a:rPr lang="en-IN" sz="2400" dirty="0">
+                <a:effectLst/>
+                <a:latin typeface="Times New Roman" panose="02020603050405020304" pitchFamily="18" charset="0"/>
+                <a:ea typeface="Times New Roman" panose="02020603050405020304" pitchFamily="18" charset="0"/>
+                <a:cs typeface="Mangal" panose="02040503050203030202" pitchFamily="18" charset="0"/>
+              </a:rPr>
+              <a:t> : for trying, testing and implementing different ideas altogether.</a:t>
+            </a:r>
+            <a:endParaRPr lang="en-IN" sz="2400" dirty="0">
+              <a:effectLst/>
+              <a:latin typeface="Calibri" panose="020F0502020204030204" pitchFamily="34" charset="0"/>
+              <a:ea typeface="Times New Roman" panose="02020603050405020304" pitchFamily="18" charset="0"/>
+              <a:cs typeface="Mangal" panose="02040503050203030202" pitchFamily="18" charset="0"/>
+            </a:endParaRPr>
+          </a:p>
+          <a:p>
+            <a:pPr marL="342900" lvl="0" indent="-342900">
+              <a:lnSpc>
+                <a:spcPct val="200000"/>
+              </a:lnSpc>
+              <a:spcAft>
+                <a:spcPts val="1000"/>
+              </a:spcAft>
+              <a:buFont typeface="Wingdings" panose="05000000000000000000" pitchFamily="2" charset="2"/>
+              <a:buChar char=""/>
+              <a:tabLst>
+                <a:tab pos="457200" algn="l"/>
+              </a:tabLst>
             </a:pPr>
             <a:r>
-              <a:rPr lang="en-IN" sz="2400" dirty="0" smtClean="0"/>
-              <a:t>Learning and working together in a team via online medium.</a:t>
-            </a:r>
-          </a:p>
-          <a:p>
-            <a:pPr>
-              <a:buFont typeface="Wingdings" pitchFamily="2" charset="2"/>
-              <a:buChar char="q"/>
-            </a:pPr>
-            <a:r>
-              <a:rPr lang="en-IN" sz="2400" dirty="0" smtClean="0"/>
-              <a:t>Utilizing the minimum resources while working online within a given period of time.</a:t>
-            </a:r>
-          </a:p>
-          <a:p>
-            <a:pPr>
-              <a:buFont typeface="Wingdings" pitchFamily="2" charset="2"/>
-              <a:buChar char="q"/>
-            </a:pPr>
-            <a:r>
-              <a:rPr lang="en-IN" sz="2400" dirty="0" smtClean="0"/>
-              <a:t>Finally, developing a website which can be accessed by everyone for free.</a:t>
-            </a:r>
-            <a:endParaRPr lang="en-US" sz="2400" dirty="0"/>
+              <a:rPr lang="en-IN" sz="2400" b="1" dirty="0">
+                <a:effectLst/>
+                <a:latin typeface="Times New Roman" panose="02020603050405020304" pitchFamily="18" charset="0"/>
+                <a:ea typeface="Times New Roman" panose="02020603050405020304" pitchFamily="18" charset="0"/>
+                <a:cs typeface="Mangal" panose="02040503050203030202" pitchFamily="18" charset="0"/>
+              </a:rPr>
+              <a:t>firebase </a:t>
+            </a:r>
+            <a:r>
+              <a:rPr lang="en-IN" sz="2400" dirty="0">
+                <a:effectLst/>
+                <a:latin typeface="Times New Roman" panose="02020603050405020304" pitchFamily="18" charset="0"/>
+                <a:ea typeface="Times New Roman" panose="02020603050405020304" pitchFamily="18" charset="0"/>
+                <a:cs typeface="Mangal" panose="02040503050203030202" pitchFamily="18" charset="0"/>
+              </a:rPr>
+              <a:t>: for online database creation.</a:t>
+            </a:r>
+            <a:endParaRPr lang="en-IN" sz="2400" dirty="0">
+              <a:effectLst/>
+              <a:latin typeface="Calibri" panose="020F0502020204030204" pitchFamily="34" charset="0"/>
+              <a:ea typeface="Times New Roman" panose="02020603050405020304" pitchFamily="18" charset="0"/>
+              <a:cs typeface="Mangal" panose="02040503050203030202" pitchFamily="18" charset="0"/>
+            </a:endParaRPr>
           </a:p>
         </p:txBody>
       </p:sp>
@@ -5474,13 +5055,6 @@
   <p:clrMapOvr>
     <a:masterClrMapping/>
   </p:clrMapOvr>
-  <p:timing>
-    <p:tnLst>
-      <p:par>
-        <p:cTn id="1" dur="indefinite" restart="never" nodeType="tmRoot"/>
-      </p:par>
-    </p:tnLst>
-  </p:timing>
 </p:sld>
 </file>
 
@@ -5514,7 +5088,7 @@
         <p:spPr>
           <a:xfrm>
             <a:off x="0" y="267494"/>
-            <a:ext cx="9144000" cy="1145282"/>
+            <a:ext cx="9144000" cy="1399032"/>
           </a:xfrm>
         </p:spPr>
         <p:txBody>
@@ -5524,10 +5098,18 @@
           <a:lstStyle/>
           <a:p>
             <a:r>
-              <a:rPr lang="en-IN" sz="6000" b="1" dirty="0" smtClean="0"/>
-              <a:t>Uses</a:t>
-            </a:r>
-            <a:endParaRPr lang="en-US" sz="6000" b="1" dirty="0" smtClean="0"/>
+              <a:rPr lang="en-IN" sz="6600" b="1" dirty="0">
+                <a:solidFill>
+                  <a:schemeClr val="tx1"/>
+                </a:solidFill>
+              </a:rPr>
+              <a:t>Tools Used </a:t>
+            </a:r>
+            <a:endParaRPr lang="en-US" sz="6600" b="1" dirty="0">
+              <a:solidFill>
+                <a:schemeClr val="tx1"/>
+              </a:solidFill>
+            </a:endParaRPr>
           </a:p>
         </p:txBody>
       </p:sp>
@@ -5541,16 +5123,9 @@
             <p:ph idx="1"/>
           </p:nvPr>
         </p:nvSpPr>
-        <p:spPr>
-          <a:xfrm>
-            <a:off x="457200" y="1556792"/>
-            <a:ext cx="8229600" cy="4898016"/>
-          </a:xfrm>
-        </p:spPr>
-        <p:txBody>
-          <a:bodyPr>
-            <a:normAutofit/>
-          </a:bodyPr>
+        <p:spPr/>
+        <p:txBody>
+          <a:bodyPr/>
           <a:lstStyle/>
           <a:p>
             <a:pPr>
@@ -5558,8 +5133,8 @@
               <a:buChar char="q"/>
             </a:pPr>
             <a:r>
-              <a:rPr lang="en-IN" sz="2400" dirty="0" smtClean="0"/>
-              <a:t>Gives a clear idea about the fee structure and scholarship offered to the students according to their performance in the previous semester and other applicable scholarships.</a:t>
+              <a:rPr lang="en-IN" dirty="0"/>
+              <a:t>Android Studio</a:t>
             </a:r>
           </a:p>
           <a:p>
@@ -5568,8 +5143,8 @@
               <a:buChar char="q"/>
             </a:pPr>
             <a:r>
-              <a:rPr lang="en-IN" sz="2400" dirty="0" smtClean="0"/>
-              <a:t>Gives precise information to the new students wanting to join the university beforehand.</a:t>
+              <a:rPr lang="en-IN" dirty="0"/>
+              <a:t>JAVA</a:t>
             </a:r>
           </a:p>
           <a:p>
@@ -5578,8 +5153,8 @@
               <a:buChar char="q"/>
             </a:pPr>
             <a:r>
-              <a:rPr lang="en-IN" sz="2400" dirty="0" smtClean="0"/>
-              <a:t>Avoids the  need to personally go to the university head office or reception in order to get the complete details, you can do it online at home.</a:t>
+              <a:rPr lang="en-IN" dirty="0"/>
+              <a:t>XML</a:t>
             </a:r>
           </a:p>
           <a:p>
@@ -5587,7 +5162,20 @@
               <a:buFont typeface="Wingdings" pitchFamily="2" charset="2"/>
               <a:buChar char="q"/>
             </a:pPr>
-            <a:endParaRPr lang="en-US" sz="2400" dirty="0"/>
+            <a:r>
+              <a:rPr lang="en-IN" dirty="0"/>
+              <a:t>Firebase Realtime Database</a:t>
+            </a:r>
+          </a:p>
+          <a:p>
+            <a:pPr>
+              <a:buFont typeface="Wingdings" pitchFamily="2" charset="2"/>
+              <a:buChar char="q"/>
+            </a:pPr>
+            <a:r>
+              <a:rPr lang="en-IN" dirty="0"/>
+              <a:t>Firebase Storage</a:t>
+            </a:r>
           </a:p>
         </p:txBody>
       </p:sp>
@@ -5596,13 +5184,6 @@
   <p:clrMapOvr>
     <a:masterClrMapping/>
   </p:clrMapOvr>
-  <p:timing>
-    <p:tnLst>
-      <p:par>
-        <p:cTn id="1" dur="indefinite" restart="never" nodeType="tmRoot"/>
-      </p:par>
-    </p:tnLst>
-  </p:timing>
 </p:sld>
 </file>
 
@@ -5625,62 +5206,42 @@
       </p:grpSpPr>
       <p:sp>
         <p:nvSpPr>
-          <p:cNvPr id="2" name="Title 1"/>
-          <p:cNvSpPr>
-            <a:spLocks noGrp="1"/>
-          </p:cNvSpPr>
-          <p:nvPr>
-            <p:ph type="title" idx="4294967295"/>
-          </p:nvPr>
-        </p:nvSpPr>
-        <p:spPr>
-          <a:xfrm>
-            <a:off x="0" y="268288"/>
-            <a:ext cx="8686800" cy="1398587"/>
-          </a:xfrm>
-        </p:spPr>
+          <p:cNvPr id="4" name="Title 3"/>
+          <p:cNvSpPr>
+            <a:spLocks noGrp="1"/>
+          </p:cNvSpPr>
+          <p:nvPr>
+            <p:ph type="title"/>
+          </p:nvPr>
+        </p:nvSpPr>
+        <p:spPr/>
         <p:txBody>
           <a:bodyPr>
-            <a:noAutofit/>
+            <a:normAutofit/>
           </a:bodyPr>
           <a:lstStyle/>
           <a:p>
             <a:r>
-              <a:rPr lang="en-IN" sz="5400" b="1" dirty="0" smtClean="0">
-                <a:solidFill>
-                  <a:schemeClr val="tx1"/>
-                </a:solidFill>
-              </a:rPr>
-              <a:t>Technological Platforms Used</a:t>
-            </a:r>
-            <a:endParaRPr lang="en-US" sz="5400" b="1" dirty="0">
-              <a:solidFill>
-                <a:schemeClr val="tx1"/>
-              </a:solidFill>
-            </a:endParaRPr>
-          </a:p>
-        </p:txBody>
-      </p:sp>
-      <p:sp>
-        <p:nvSpPr>
-          <p:cNvPr id="3" name="Content Placeholder 2"/>
-          <p:cNvSpPr>
-            <a:spLocks noGrp="1"/>
-          </p:cNvSpPr>
-          <p:nvPr>
-            <p:ph idx="4294967295"/>
-          </p:nvPr>
-        </p:nvSpPr>
-        <p:spPr>
-          <a:xfrm>
-            <a:off x="0" y="2348879"/>
-            <a:ext cx="8686800" cy="4105895"/>
-          </a:xfrm>
-        </p:spPr>
-        <p:txBody>
-          <a:bodyPr>
-            <a:normAutofit fontScale="92500"/>
-          </a:bodyPr>
+              <a:rPr lang="en-IN" sz="6600" b="1" dirty="0"/>
+              <a:t>Salient Features</a:t>
+            </a:r>
+            <a:endParaRPr lang="en-US" sz="6600" b="1" dirty="0"/>
+          </a:p>
+        </p:txBody>
+      </p:sp>
+      <p:sp>
+        <p:nvSpPr>
+          <p:cNvPr id="5" name="Content Placeholder 4"/>
+          <p:cNvSpPr>
+            <a:spLocks noGrp="1"/>
+          </p:cNvSpPr>
+          <p:nvPr>
+            <p:ph idx="1"/>
+          </p:nvPr>
+        </p:nvSpPr>
+        <p:spPr/>
+        <p:txBody>
+          <a:bodyPr/>
           <a:lstStyle/>
           <a:p>
             <a:pPr>
@@ -5688,8 +5249,8 @@
               <a:buChar char="q"/>
             </a:pPr>
             <a:r>
-              <a:rPr lang="en-IN" dirty="0" smtClean="0"/>
-              <a:t>Git Hub : for doing and keeping a record of the collective team work.</a:t>
+              <a:rPr lang="en-IN" dirty="0"/>
+              <a:t>Effective and efficient way of chatting.</a:t>
             </a:r>
           </a:p>
           <a:p>
@@ -5698,8 +5259,8 @@
               <a:buChar char="q"/>
             </a:pPr>
             <a:r>
-              <a:rPr lang="en-IN" dirty="0" smtClean="0"/>
-              <a:t>MS Teams : for communicating together online and screen sharing for collective ideas.</a:t>
+              <a:rPr lang="en-IN" dirty="0"/>
+              <a:t>Extra technical knowledge is not required to operate the system.</a:t>
             </a:r>
           </a:p>
           <a:p>
@@ -5708,12 +5269,8 @@
               <a:buChar char="q"/>
             </a:pPr>
             <a:r>
-              <a:rPr lang="en-IN" dirty="0" smtClean="0"/>
-              <a:t>Eclipse : for trying, testing and implementing different ideas altogether</a:t>
-            </a:r>
-            <a:r>
-              <a:rPr lang="en-IN" dirty="0" smtClean="0"/>
-              <a:t>.</a:t>
+              <a:rPr lang="en-IN" dirty="0"/>
+              <a:t>Available at anytime, anywhere and to anyone.</a:t>
             </a:r>
           </a:p>
           <a:p>
@@ -5721,51 +5278,7 @@
               <a:buFont typeface="Wingdings" pitchFamily="2" charset="2"/>
               <a:buChar char="q"/>
             </a:pPr>
-            <a:r>
-              <a:rPr lang="en-IN" dirty="0" err="1" smtClean="0"/>
-              <a:t>Heroku</a:t>
-            </a:r>
-            <a:r>
-              <a:rPr lang="en-IN" dirty="0" smtClean="0"/>
-              <a:t> : For online deploying the </a:t>
-            </a:r>
-            <a:r>
-              <a:rPr lang="en-IN" smtClean="0"/>
-              <a:t>website.</a:t>
-            </a:r>
-            <a:endParaRPr lang="en-IN" dirty="0" smtClean="0"/>
-          </a:p>
-          <a:p>
-            <a:pPr>
-              <a:buFont typeface="Wingdings" pitchFamily="2" charset="2"/>
-              <a:buChar char="q"/>
-            </a:pPr>
-            <a:r>
-              <a:rPr lang="en-IN" dirty="0" err="1" smtClean="0"/>
-              <a:t>f</a:t>
-            </a:r>
-            <a:r>
-              <a:rPr lang="en-IN" dirty="0" err="1" smtClean="0"/>
-              <a:t>reedb.tech</a:t>
-            </a:r>
-            <a:r>
-              <a:rPr lang="en-IN" dirty="0" smtClean="0"/>
-              <a:t> : for online database creation.</a:t>
-            </a:r>
-            <a:endParaRPr lang="en-IN" dirty="0" smtClean="0"/>
-          </a:p>
-          <a:p>
-            <a:pPr>
-              <a:buNone/>
-            </a:pPr>
-            <a:endParaRPr lang="en-IN" dirty="0" smtClean="0"/>
-          </a:p>
-          <a:p>
-            <a:pPr>
-              <a:buFont typeface="Wingdings" pitchFamily="2" charset="2"/>
-              <a:buChar char="q"/>
-            </a:pPr>
-            <a:endParaRPr lang="en-IN" dirty="0" smtClean="0"/>
+            <a:endParaRPr lang="en-US" dirty="0"/>
           </a:p>
         </p:txBody>
       </p:sp>
@@ -5774,13 +5287,6 @@
   <p:clrMapOvr>
     <a:masterClrMapping/>
   </p:clrMapOvr>
-  <p:timing>
-    <p:tnLst>
-      <p:par>
-        <p:cTn id="1" dur="indefinite" restart="never" nodeType="tmRoot"/>
-      </p:par>
-    </p:tnLst>
-  </p:timing>
 </p:sld>
 </file>
 
@@ -5813,25 +5319,25 @@
         </p:nvSpPr>
         <p:spPr>
           <a:xfrm>
-            <a:off x="0" y="267494"/>
-            <a:ext cx="9144000" cy="1399032"/>
+            <a:off x="228600" y="267494"/>
+            <a:ext cx="8915400" cy="1399032"/>
           </a:xfrm>
         </p:spPr>
         <p:txBody>
           <a:bodyPr>
-            <a:noAutofit/>
+            <a:normAutofit fontScale="90000"/>
           </a:bodyPr>
           <a:lstStyle/>
           <a:p>
             <a:r>
-              <a:rPr lang="en-IN" sz="6600" b="1" dirty="0" smtClean="0">
+              <a:rPr lang="en-IN" sz="6700" b="1" dirty="0">
                 <a:solidFill>
                   <a:schemeClr val="tx1"/>
                 </a:solidFill>
               </a:rPr>
-              <a:t>Languages Used </a:t>
-            </a:r>
-            <a:endParaRPr lang="en-US" sz="6600" b="1" dirty="0">
+              <a:t>Application Snapshots</a:t>
+            </a:r>
+            <a:endParaRPr lang="en-US" i="1" dirty="0">
               <a:solidFill>
                 <a:schemeClr val="tx1"/>
               </a:solidFill>
@@ -5839,122 +5345,89 @@
           </a:p>
         </p:txBody>
       </p:sp>
-      <p:sp>
-        <p:nvSpPr>
-          <p:cNvPr id="5" name="Content Placeholder 4"/>
-          <p:cNvSpPr>
-            <a:spLocks noGrp="1"/>
-          </p:cNvSpPr>
-          <p:nvPr>
-            <p:ph idx="1"/>
-          </p:nvPr>
-        </p:nvSpPr>
-        <p:spPr/>
-        <p:txBody>
-          <a:bodyPr/>
-          <a:lstStyle/>
-          <a:p>
-            <a:pPr>
-              <a:buFont typeface="Wingdings" pitchFamily="2" charset="2"/>
-              <a:buChar char="q"/>
-            </a:pPr>
-            <a:r>
-              <a:rPr lang="en-IN" dirty="0" smtClean="0"/>
-              <a:t>HTML (</a:t>
-            </a:r>
-            <a:r>
-              <a:rPr lang="en-IN" dirty="0" err="1" smtClean="0"/>
-              <a:t>HyperText</a:t>
-            </a:r>
-            <a:r>
-              <a:rPr lang="en-IN" dirty="0" smtClean="0"/>
-              <a:t> </a:t>
-            </a:r>
-            <a:r>
-              <a:rPr lang="en-IN" dirty="0" err="1" smtClean="0"/>
-              <a:t>Markup</a:t>
-            </a:r>
-            <a:r>
-              <a:rPr lang="en-IN" dirty="0" smtClean="0"/>
-              <a:t> Language)</a:t>
-            </a:r>
-          </a:p>
-          <a:p>
-            <a:pPr>
-              <a:buFont typeface="Wingdings" pitchFamily="2" charset="2"/>
-              <a:buChar char="q"/>
-            </a:pPr>
-            <a:r>
-              <a:rPr lang="en-IN" dirty="0" smtClean="0"/>
-              <a:t>PHP ( </a:t>
-            </a:r>
-            <a:r>
-              <a:rPr lang="en-IN" dirty="0" err="1" smtClean="0"/>
-              <a:t>HyperText</a:t>
-            </a:r>
-            <a:r>
-              <a:rPr lang="en-IN" dirty="0" smtClean="0"/>
-              <a:t> </a:t>
-            </a:r>
-            <a:r>
-              <a:rPr lang="en-IN" dirty="0" err="1" smtClean="0"/>
-              <a:t>Preprocessor</a:t>
-            </a:r>
-            <a:r>
-              <a:rPr lang="en-IN" dirty="0" smtClean="0"/>
-              <a:t>)</a:t>
-            </a:r>
-          </a:p>
-          <a:p>
-            <a:pPr>
-              <a:buFont typeface="Wingdings" pitchFamily="2" charset="2"/>
-              <a:buChar char="q"/>
-            </a:pPr>
-            <a:r>
-              <a:rPr lang="en-IN" dirty="0" err="1" smtClean="0"/>
-              <a:t>Javascript</a:t>
-            </a:r>
-            <a:endParaRPr lang="en-IN" dirty="0" smtClean="0"/>
-          </a:p>
-          <a:p>
-            <a:pPr>
-              <a:buFont typeface="Wingdings" pitchFamily="2" charset="2"/>
-              <a:buChar char="q"/>
-            </a:pPr>
-            <a:r>
-              <a:rPr lang="en-IN" dirty="0" smtClean="0"/>
-              <a:t>For styling : CSS (Cascading Style Sheets)</a:t>
-            </a:r>
-          </a:p>
-          <a:p>
-            <a:pPr>
-              <a:buFont typeface="Wingdings" pitchFamily="2" charset="2"/>
-              <a:buChar char="q"/>
-            </a:pPr>
-            <a:r>
-              <a:rPr lang="en-IN" dirty="0" smtClean="0"/>
-              <a:t>Database used : </a:t>
-            </a:r>
-            <a:r>
-              <a:rPr lang="en-IN" dirty="0" err="1" smtClean="0"/>
-              <a:t>MySQL</a:t>
-            </a:r>
-            <a:endParaRPr lang="en-IN" dirty="0" smtClean="0"/>
-          </a:p>
-        </p:txBody>
-      </p:sp>
+      <p:pic>
+        <p:nvPicPr>
+          <p:cNvPr id="6" name="Picture 5">
+            <a:extLst>
+              <a:ext uri="{FF2B5EF4-FFF2-40B4-BE49-F238E27FC236}">
+                <a16:creationId xmlns:a16="http://schemas.microsoft.com/office/drawing/2014/main" id="{474401C6-7955-4108-95E2-65E0C8186DEF}"/>
+              </a:ext>
+            </a:extLst>
+          </p:cNvPr>
+          <p:cNvPicPr/>
+          <p:nvPr/>
+        </p:nvPicPr>
+        <p:blipFill>
+          <a:blip r:embed="rId2">
+            <a:extLst>
+              <a:ext uri="{28A0092B-C50C-407E-A947-70E740481C1C}">
+                <a14:useLocalDpi xmlns:a14="http://schemas.microsoft.com/office/drawing/2010/main" val="0"/>
+              </a:ext>
+            </a:extLst>
+          </a:blip>
+          <a:srcRect/>
+          <a:stretch>
+            <a:fillRect/>
+          </a:stretch>
+        </p:blipFill>
+        <p:spPr bwMode="auto">
+          <a:xfrm>
+            <a:off x="443508" y="1601508"/>
+            <a:ext cx="3672408" cy="5134599"/>
+          </a:xfrm>
+          <a:prstGeom prst="rect">
+            <a:avLst/>
+          </a:prstGeom>
+          <a:noFill/>
+          <a:ln>
+            <a:noFill/>
+          </a:ln>
+        </p:spPr>
+      </p:pic>
+      <p:pic>
+        <p:nvPicPr>
+          <p:cNvPr id="7" name="Picture 6">
+            <a:extLst>
+              <a:ext uri="{FF2B5EF4-FFF2-40B4-BE49-F238E27FC236}">
+                <a16:creationId xmlns:a16="http://schemas.microsoft.com/office/drawing/2014/main" id="{EF279F2E-07A6-4A26-AD6B-7F1E1E3922EC}"/>
+              </a:ext>
+            </a:extLst>
+          </p:cNvPr>
+          <p:cNvPicPr/>
+          <p:nvPr/>
+        </p:nvPicPr>
+        <p:blipFill>
+          <a:blip r:embed="rId3">
+            <a:extLst>
+              <a:ext uri="{28A0092B-C50C-407E-A947-70E740481C1C}">
+                <a14:useLocalDpi xmlns:a14="http://schemas.microsoft.com/office/drawing/2010/main" val="0"/>
+              </a:ext>
+            </a:extLst>
+          </a:blip>
+          <a:srcRect/>
+          <a:stretch>
+            <a:fillRect/>
+          </a:stretch>
+        </p:blipFill>
+        <p:spPr bwMode="auto">
+          <a:xfrm>
+            <a:off x="4928836" y="1601507"/>
+            <a:ext cx="3986564" cy="5134600"/>
+          </a:xfrm>
+          <a:prstGeom prst="rect">
+            <a:avLst/>
+          </a:prstGeom>
+          <a:noFill/>
+          <a:ln>
+            <a:noFill/>
+          </a:ln>
+        </p:spPr>
+      </p:pic>
     </p:spTree>
   </p:cSld>
   <p:clrMapOvr>
     <a:masterClrMapping/>
   </p:clrMapOvr>
-  <p:timing>
-    <p:tnLst>
-      <p:par>
-        <p:cTn id="1" dur="indefinite" restart="never" nodeType="tmRoot"/>
-      </p:par>
-    </p:tnLst>
-  </p:timing>
 </p:sld>
 </file>
 

</xml_diff>